<commit_message>
pptx file now a dyn link to the Instructors file
</commit_message>
<xml_diff>
--- a/NYC-subway-intro.pptx
+++ b/NYC-subway-intro.pptx
@@ -5,32 +5,34 @@
     <p:sldMasterId id="2147483656" r:id="rId1"/>
   </p:sldMasterIdLst>
   <p:notesMasterIdLst>
-    <p:notesMasterId r:id="rId25"/>
+    <p:notesMasterId r:id="rId27"/>
   </p:notesMasterIdLst>
   <p:sldIdLst>
     <p:sldId id="256" r:id="rId2"/>
-    <p:sldId id="257" r:id="rId3"/>
-    <p:sldId id="258" r:id="rId4"/>
-    <p:sldId id="259" r:id="rId5"/>
-    <p:sldId id="260" r:id="rId6"/>
-    <p:sldId id="261" r:id="rId7"/>
-    <p:sldId id="262" r:id="rId8"/>
-    <p:sldId id="263" r:id="rId9"/>
-    <p:sldId id="264" r:id="rId10"/>
-    <p:sldId id="265" r:id="rId11"/>
-    <p:sldId id="266" r:id="rId12"/>
-    <p:sldId id="267" r:id="rId13"/>
-    <p:sldId id="268" r:id="rId14"/>
-    <p:sldId id="269" r:id="rId15"/>
-    <p:sldId id="270" r:id="rId16"/>
-    <p:sldId id="271" r:id="rId17"/>
-    <p:sldId id="272" r:id="rId18"/>
-    <p:sldId id="273" r:id="rId19"/>
-    <p:sldId id="274" r:id="rId20"/>
-    <p:sldId id="275" r:id="rId21"/>
-    <p:sldId id="276" r:id="rId22"/>
-    <p:sldId id="277" r:id="rId23"/>
-    <p:sldId id="278" r:id="rId24"/>
+    <p:sldId id="280" r:id="rId3"/>
+    <p:sldId id="257" r:id="rId4"/>
+    <p:sldId id="258" r:id="rId5"/>
+    <p:sldId id="259" r:id="rId6"/>
+    <p:sldId id="260" r:id="rId7"/>
+    <p:sldId id="261" r:id="rId8"/>
+    <p:sldId id="262" r:id="rId9"/>
+    <p:sldId id="263" r:id="rId10"/>
+    <p:sldId id="264" r:id="rId11"/>
+    <p:sldId id="265" r:id="rId12"/>
+    <p:sldId id="266" r:id="rId13"/>
+    <p:sldId id="267" r:id="rId14"/>
+    <p:sldId id="268" r:id="rId15"/>
+    <p:sldId id="269" r:id="rId16"/>
+    <p:sldId id="270" r:id="rId17"/>
+    <p:sldId id="271" r:id="rId18"/>
+    <p:sldId id="272" r:id="rId19"/>
+    <p:sldId id="273" r:id="rId20"/>
+    <p:sldId id="274" r:id="rId21"/>
+    <p:sldId id="275" r:id="rId22"/>
+    <p:sldId id="276" r:id="rId23"/>
+    <p:sldId id="277" r:id="rId24"/>
+    <p:sldId id="278" r:id="rId25"/>
+    <p:sldId id="279" r:id="rId26"/>
   </p:sldIdLst>
   <p:sldSz cx="9144000" cy="5143500" type="screen16x9"/>
   <p:notesSz cx="6858000" cy="9144000"/>
@@ -236,6 +238,22 @@
       </a:defRPr>
     </a:lvl9pPr>
   </p:defaultTextStyle>
+  <p:extLst>
+    <p:ext uri="{EFAFB233-063F-42B5-8137-9DF3F51BA10A}">
+      <p15:sldGuideLst xmlns:p15="http://schemas.microsoft.com/office/powerpoint/2012/main">
+        <p15:guide id="1" orient="horz" pos="1620">
+          <p15:clr>
+            <a:srgbClr val="A4A3A4"/>
+          </p15:clr>
+        </p15:guide>
+        <p15:guide id="2" pos="2880">
+          <p15:clr>
+            <a:srgbClr val="A4A3A4"/>
+          </p15:clr>
+        </p15:guide>
+      </p15:sldGuideLst>
+    </p:ext>
+  </p:extLst>
 </p:presentation>
 </file>
 
@@ -2041,7 +2059,7 @@
           <a:p>
             <a:fld id="{977C0067-6AE1-8242-8BD4-895A1CBF1AE7}" type="datetimeFigureOut">
               <a:rPr lang="en-US" smtClean="0"/>
-              <a:t>3/15/16</a:t>
+              <a:t>2/27/17</a:t>
             </a:fld>
             <a:endParaRPr lang="en-US"/>
           </a:p>
@@ -2226,7 +2244,7 @@
           <a:p>
             <a:fld id="{977C0067-6AE1-8242-8BD4-895A1CBF1AE7}" type="datetimeFigureOut">
               <a:rPr lang="en-US" smtClean="0"/>
-              <a:t>3/15/16</a:t>
+              <a:t>2/27/17</a:t>
             </a:fld>
             <a:endParaRPr lang="en-US"/>
           </a:p>
@@ -2421,7 +2439,7 @@
           <a:p>
             <a:fld id="{977C0067-6AE1-8242-8BD4-895A1CBF1AE7}" type="datetimeFigureOut">
               <a:rPr lang="en-US" smtClean="0"/>
-              <a:t>3/15/16</a:t>
+              <a:t>2/27/17</a:t>
             </a:fld>
             <a:endParaRPr lang="en-US"/>
           </a:p>
@@ -2834,7 +2852,7 @@
           <a:p>
             <a:fld id="{2ED246A7-3F60-4D4F-87FA-6A27881C4D67}" type="datetimeFigureOut">
               <a:rPr lang="en-US" smtClean="0"/>
-              <a:t>3/15/16</a:t>
+              <a:t>2/27/17</a:t>
             </a:fld>
             <a:endParaRPr lang="en-US"/>
           </a:p>
@@ -3080,7 +3098,7 @@
           <a:p>
             <a:fld id="{977C0067-6AE1-8242-8BD4-895A1CBF1AE7}" type="datetimeFigureOut">
               <a:rPr lang="en-US" smtClean="0"/>
-              <a:t>3/15/16</a:t>
+              <a:t>2/27/17</a:t>
             </a:fld>
             <a:endParaRPr lang="en-US"/>
           </a:p>
@@ -3383,7 +3401,7 @@
           <a:p>
             <a:fld id="{977C0067-6AE1-8242-8BD4-895A1CBF1AE7}" type="datetimeFigureOut">
               <a:rPr lang="en-US" smtClean="0"/>
-              <a:t>3/15/16</a:t>
+              <a:t>2/27/17</a:t>
             </a:fld>
             <a:endParaRPr lang="en-US"/>
           </a:p>
@@ -3820,7 +3838,7 @@
           <a:p>
             <a:fld id="{977C0067-6AE1-8242-8BD4-895A1CBF1AE7}" type="datetimeFigureOut">
               <a:rPr lang="en-US" smtClean="0"/>
-              <a:t>3/15/16</a:t>
+              <a:t>2/27/17</a:t>
             </a:fld>
             <a:endParaRPr lang="en-US"/>
           </a:p>
@@ -3953,7 +3971,7 @@
           <a:p>
             <a:fld id="{977C0067-6AE1-8242-8BD4-895A1CBF1AE7}" type="datetimeFigureOut">
               <a:rPr lang="en-US" smtClean="0"/>
-              <a:t>3/15/16</a:t>
+              <a:t>2/27/17</a:t>
             </a:fld>
             <a:endParaRPr lang="en-US"/>
           </a:p>
@@ -4063,7 +4081,7 @@
           <a:p>
             <a:fld id="{977C0067-6AE1-8242-8BD4-895A1CBF1AE7}" type="datetimeFigureOut">
               <a:rPr lang="en-US" smtClean="0"/>
-              <a:t>3/15/16</a:t>
+              <a:t>2/27/17</a:t>
             </a:fld>
             <a:endParaRPr lang="en-US"/>
           </a:p>
@@ -4346,7 +4364,7 @@
           <a:p>
             <a:fld id="{977C0067-6AE1-8242-8BD4-895A1CBF1AE7}" type="datetimeFigureOut">
               <a:rPr lang="en-US" smtClean="0"/>
-              <a:t>3/15/16</a:t>
+              <a:t>2/27/17</a:t>
             </a:fld>
             <a:endParaRPr lang="en-US"/>
           </a:p>
@@ -4614,7 +4632,7 @@
           <a:p>
             <a:fld id="{977C0067-6AE1-8242-8BD4-895A1CBF1AE7}" type="datetimeFigureOut">
               <a:rPr lang="en-US" smtClean="0"/>
-              <a:t>3/15/16</a:t>
+              <a:t>2/27/17</a:t>
             </a:fld>
             <a:endParaRPr lang="en-US"/>
           </a:p>
@@ -4842,7 +4860,7 @@
           <a:p>
             <a:fld id="{977C0067-6AE1-8242-8BD4-895A1CBF1AE7}" type="datetimeFigureOut">
               <a:rPr lang="en-US" smtClean="0"/>
-              <a:t>3/15/16</a:t>
+              <a:t>2/27/17</a:t>
             </a:fld>
             <a:endParaRPr lang="en-US"/>
           </a:p>
@@ -5303,13 +5321,13 @@
   <p:clrMapOvr>
     <a:masterClrMapping/>
   </p:clrMapOvr>
-  <p:transition xmlns:p14="http://schemas.microsoft.com/office/powerpoint/2010/main" spd="slow">
+  <p:transition spd="slow">
     <p:cut/>
   </p:transition>
   <p:timing>
     <p:tnLst>
       <p:par>
-        <p:cTn xmlns:p14="http://schemas.microsoft.com/office/powerpoint/2010/main" id="1" dur="indefinite" restart="never" nodeType="tmRoot"/>
+        <p:cTn id="1" dur="indefinite" restart="never" nodeType="tmRoot"/>
       </p:par>
     </p:tnLst>
   </p:timing>
@@ -5317,6 +5335,154 @@
 </file>
 
 <file path=ppt/slides/slide10.xml><?xml version="1.0" encoding="utf-8"?>
+<p:sld xmlns:a="http://schemas.openxmlformats.org/drawingml/2006/main" xmlns:r="http://schemas.openxmlformats.org/officeDocument/2006/relationships" xmlns:p="http://schemas.openxmlformats.org/presentationml/2006/main">
+  <p:cSld>
+    <p:spTree>
+      <p:nvGrpSpPr>
+        <p:cNvPr id="1" name="Shape 83"/>
+        <p:cNvGrpSpPr/>
+        <p:nvPr/>
+      </p:nvGrpSpPr>
+      <p:grpSpPr>
+        <a:xfrm>
+          <a:off x="0" y="0"/>
+          <a:ext cx="0" cy="0"/>
+          <a:chOff x="0" y="0"/>
+          <a:chExt cx="0" cy="0"/>
+        </a:xfrm>
+      </p:grpSpPr>
+      <p:sp>
+        <p:nvSpPr>
+          <p:cNvPr id="84" name="Shape 84"/>
+          <p:cNvSpPr txBox="1">
+            <a:spLocks noGrp="1"/>
+          </p:cNvSpPr>
+          <p:nvPr>
+            <p:ph type="title"/>
+          </p:nvPr>
+        </p:nvSpPr>
+        <p:spPr>
+          <a:prstGeom prst="rect">
+            <a:avLst/>
+          </a:prstGeom>
+        </p:spPr>
+        <p:txBody>
+          <a:bodyPr lIns="91425" tIns="91425" rIns="91425" bIns="91425" anchor="b" anchorCtr="0">
+            <a:noAutofit/>
+          </a:bodyPr>
+          <a:lstStyle/>
+          <a:p>
+            <a:pPr lvl="0">
+              <a:spcBef>
+                <a:spcPts val="0"/>
+              </a:spcBef>
+              <a:buNone/>
+            </a:pPr>
+            <a:r>
+              <a:rPr lang="en"/>
+              <a:t>This practical</a:t>
+            </a:r>
+          </a:p>
+        </p:txBody>
+      </p:sp>
+      <p:sp>
+        <p:nvSpPr>
+          <p:cNvPr id="85" name="Shape 85"/>
+          <p:cNvSpPr txBox="1">
+            <a:spLocks noGrp="1"/>
+          </p:cNvSpPr>
+          <p:nvPr>
+            <p:ph type="body" idx="1"/>
+          </p:nvPr>
+        </p:nvSpPr>
+        <p:spPr>
+          <a:prstGeom prst="rect">
+            <a:avLst/>
+          </a:prstGeom>
+        </p:spPr>
+        <p:txBody>
+          <a:bodyPr lIns="91425" tIns="91425" rIns="91425" bIns="91425" anchor="t" anchorCtr="0">
+            <a:noAutofit/>
+          </a:bodyPr>
+          <a:lstStyle/>
+          <a:p>
+            <a:pPr lvl="0" rtl="0">
+              <a:spcBef>
+                <a:spcPts val="0"/>
+              </a:spcBef>
+              <a:buNone/>
+            </a:pPr>
+            <a:r>
+              <a:rPr lang="en"/>
+              <a:t>Aims:</a:t>
+            </a:r>
+          </a:p>
+          <a:p>
+            <a:pPr lvl="0" rtl="0">
+              <a:spcBef>
+                <a:spcPts val="0"/>
+              </a:spcBef>
+              <a:buNone/>
+            </a:pPr>
+            <a:r>
+              <a:rPr lang="en"/>
+              <a:t>	Get used to handling real data sets</a:t>
+            </a:r>
+          </a:p>
+          <a:p>
+            <a:pPr lvl="0" indent="457200" rtl="0">
+              <a:spcBef>
+                <a:spcPts val="0"/>
+              </a:spcBef>
+              <a:buNone/>
+            </a:pPr>
+            <a:r>
+              <a:rPr lang="en"/>
+              <a:t>Compare results from different pipelines</a:t>
+            </a:r>
+          </a:p>
+          <a:p>
+            <a:pPr lvl="0" indent="457200" rtl="0">
+              <a:spcBef>
+                <a:spcPts val="0"/>
+              </a:spcBef>
+              <a:buNone/>
+            </a:pPr>
+            <a:r>
+              <a:rPr lang="en"/>
+              <a:t>Munge Excel</a:t>
+            </a:r>
+          </a:p>
+          <a:p>
+            <a:pPr lvl="0" indent="457200">
+              <a:spcBef>
+                <a:spcPts val="0"/>
+              </a:spcBef>
+              <a:buNone/>
+            </a:pPr>
+            <a:endParaRPr/>
+          </a:p>
+        </p:txBody>
+      </p:sp>
+    </p:spTree>
+  </p:cSld>
+  <p:clrMapOvr>
+    <a:masterClrMapping/>
+  </p:clrMapOvr>
+  <p:transition spd="slow">
+    <p:cut/>
+  </p:transition>
+  <p:timing>
+    <p:tnLst>
+      <p:par>
+        <p:cTn id="1" dur="indefinite" restart="never" nodeType="tmRoot"/>
+      </p:par>
+    </p:tnLst>
+  </p:timing>
+</p:sld>
+</file>
+
+<file path=ppt/slides/slide11.xml><?xml version="1.0" encoding="utf-8"?>
 <p:sld xmlns:a="http://schemas.openxmlformats.org/drawingml/2006/main" xmlns:r="http://schemas.openxmlformats.org/officeDocument/2006/relationships" xmlns:p="http://schemas.openxmlformats.org/presentationml/2006/main">
   <p:cSld>
     <p:spTree>
@@ -5388,14 +5554,14 @@
   <p:timing>
     <p:tnLst>
       <p:par>
-        <p:cTn xmlns:p14="http://schemas.microsoft.com/office/powerpoint/2010/main" id="1" dur="indefinite" restart="never" nodeType="tmRoot"/>
+        <p:cTn id="1" dur="indefinite" restart="never" nodeType="tmRoot"/>
       </p:par>
     </p:tnLst>
   </p:timing>
 </p:sld>
 </file>
 
-<file path=ppt/slides/slide11.xml><?xml version="1.0" encoding="utf-8"?>
+<file path=ppt/slides/slide12.xml><?xml version="1.0" encoding="utf-8"?>
 <p:sld xmlns:a="http://schemas.openxmlformats.org/drawingml/2006/main" xmlns:r="http://schemas.openxmlformats.org/officeDocument/2006/relationships" xmlns:p="http://schemas.openxmlformats.org/presentationml/2006/main">
   <p:cSld>
     <p:spTree>
@@ -5475,14 +5641,14 @@
   <p:timing>
     <p:tnLst>
       <p:par>
-        <p:cTn xmlns:p14="http://schemas.microsoft.com/office/powerpoint/2010/main" id="1" dur="indefinite" restart="never" nodeType="tmRoot"/>
+        <p:cTn id="1" dur="indefinite" restart="never" nodeType="tmRoot"/>
       </p:par>
     </p:tnLst>
   </p:timing>
 </p:sld>
 </file>
 
-<file path=ppt/slides/slide12.xml><?xml version="1.0" encoding="utf-8"?>
+<file path=ppt/slides/slide13.xml><?xml version="1.0" encoding="utf-8"?>
 <p:sld xmlns:a="http://schemas.openxmlformats.org/drawingml/2006/main" xmlns:r="http://schemas.openxmlformats.org/officeDocument/2006/relationships" xmlns:p="http://schemas.openxmlformats.org/presentationml/2006/main">
   <p:cSld>
     <p:spTree>
@@ -5564,14 +5730,14 @@
   <p:timing>
     <p:tnLst>
       <p:par>
-        <p:cTn xmlns:p14="http://schemas.microsoft.com/office/powerpoint/2010/main" id="1" dur="indefinite" restart="never" nodeType="tmRoot"/>
+        <p:cTn id="1" dur="indefinite" restart="never" nodeType="tmRoot"/>
       </p:par>
     </p:tnLst>
   </p:timing>
 </p:sld>
 </file>
 
-<file path=ppt/slides/slide13.xml><?xml version="1.0" encoding="utf-8"?>
+<file path=ppt/slides/slide14.xml><?xml version="1.0" encoding="utf-8"?>
 <p:sld xmlns:a="http://schemas.openxmlformats.org/drawingml/2006/main" xmlns:r="http://schemas.openxmlformats.org/officeDocument/2006/relationships" xmlns:p="http://schemas.openxmlformats.org/presentationml/2006/main">
   <p:cSld>
     <p:spTree>
@@ -5676,134 +5842,7 @@
   <p:timing>
     <p:tnLst>
       <p:par>
-        <p:cTn xmlns:p14="http://schemas.microsoft.com/office/powerpoint/2010/main" id="1" dur="indefinite" restart="never" nodeType="tmRoot"/>
-      </p:par>
-    </p:tnLst>
-  </p:timing>
-</p:sld>
-</file>
-
-<file path=ppt/slides/slide14.xml><?xml version="1.0" encoding="utf-8"?>
-<p:sld xmlns:a="http://schemas.openxmlformats.org/drawingml/2006/main" xmlns:r="http://schemas.openxmlformats.org/officeDocument/2006/relationships" xmlns:p="http://schemas.openxmlformats.org/presentationml/2006/main">
-  <p:cSld>
-    <p:spTree>
-      <p:nvGrpSpPr>
-        <p:cNvPr id="1" name=""/>
-        <p:cNvGrpSpPr/>
-        <p:nvPr/>
-      </p:nvGrpSpPr>
-      <p:grpSpPr>
-        <a:xfrm>
-          <a:off x="0" y="0"/>
-          <a:ext cx="0" cy="0"/>
-          <a:chOff x="0" y="0"/>
-          <a:chExt cx="0" cy="0"/>
-        </a:xfrm>
-      </p:grpSpPr>
-      <p:sp>
-        <p:nvSpPr>
-          <p:cNvPr id="2" name="Title 1"/>
-          <p:cNvSpPr>
-            <a:spLocks noGrp="1"/>
-          </p:cNvSpPr>
-          <p:nvPr>
-            <p:ph type="title"/>
-          </p:nvPr>
-        </p:nvSpPr>
-        <p:spPr/>
-        <p:txBody>
-          <a:bodyPr/>
-          <a:lstStyle/>
-          <a:p>
-            <a:r>
-              <a:rPr lang="en-US" dirty="0" smtClean="0"/>
-              <a:t>Kraken</a:t>
-            </a:r>
-            <a:endParaRPr lang="en-US" dirty="0"/>
-          </a:p>
-        </p:txBody>
-      </p:sp>
-      <p:sp>
-        <p:nvSpPr>
-          <p:cNvPr id="3" name="Content Placeholder 2"/>
-          <p:cNvSpPr>
-            <a:spLocks noGrp="1"/>
-          </p:cNvSpPr>
-          <p:nvPr>
-            <p:ph idx="1"/>
-          </p:nvPr>
-        </p:nvSpPr>
-        <p:spPr/>
-        <p:txBody>
-          <a:bodyPr>
-            <a:normAutofit lnSpcReduction="10000"/>
-          </a:bodyPr>
-          <a:lstStyle/>
-          <a:p>
-            <a:r>
-              <a:rPr lang="en-US" dirty="0" smtClean="0">
-                <a:solidFill>
-                  <a:schemeClr val="bg1">
-                    <a:lumMod val="85000"/>
-                  </a:schemeClr>
-                </a:solidFill>
-              </a:rPr>
-              <a:t>Matches sequence of each read against a database</a:t>
-            </a:r>
-          </a:p>
-          <a:p>
-            <a:r>
-              <a:rPr lang="en-US" dirty="0" smtClean="0"/>
-              <a:t>Uses </a:t>
-            </a:r>
-            <a:r>
-              <a:rPr lang="en-US" u="sng" dirty="0" smtClean="0"/>
-              <a:t>k-</a:t>
-            </a:r>
-            <a:r>
-              <a:rPr lang="en-US" u="sng" dirty="0" err="1" smtClean="0"/>
-              <a:t>mer</a:t>
-            </a:r>
-            <a:r>
-              <a:rPr lang="en-US" u="sng" dirty="0" smtClean="0"/>
-              <a:t> </a:t>
-            </a:r>
-            <a:r>
-              <a:rPr lang="en-US" dirty="0" smtClean="0"/>
-              <a:t>matching</a:t>
-            </a:r>
-          </a:p>
-          <a:p>
-            <a:r>
-              <a:rPr lang="en-US" dirty="0" smtClean="0"/>
-              <a:t>Alignment based methods (</a:t>
-            </a:r>
-            <a:r>
-              <a:rPr lang="en-US" dirty="0" err="1" smtClean="0"/>
-              <a:t>e.g</a:t>
-            </a:r>
-            <a:r>
-              <a:rPr lang="en-US" dirty="0" smtClean="0"/>
-              <a:t> BLAST) are too slow for the size of the database (all organisms) and the query database (millions of reads)</a:t>
-            </a:r>
-            <a:endParaRPr lang="en-US" dirty="0"/>
-          </a:p>
-        </p:txBody>
-      </p:sp>
-    </p:spTree>
-    <p:extLst>
-      <p:ext uri="{BB962C8B-B14F-4D97-AF65-F5344CB8AC3E}">
-        <p14:creationId xmlns:p14="http://schemas.microsoft.com/office/powerpoint/2010/main" val="4080729891"/>
-      </p:ext>
-    </p:extLst>
-  </p:cSld>
-  <p:clrMapOvr>
-    <a:masterClrMapping/>
-  </p:clrMapOvr>
-  <p:timing>
-    <p:tnLst>
-      <p:par>
-        <p:cTn xmlns:p14="http://schemas.microsoft.com/office/powerpoint/2010/main" id="1" dur="indefinite" restart="never" nodeType="tmRoot"/>
+        <p:cTn id="1" dur="indefinite" restart="never" nodeType="tmRoot"/>
       </p:par>
     </p:tnLst>
   </p:timing>
@@ -5844,44 +5883,66 @@
           <a:p>
             <a:r>
               <a:rPr lang="en-US" dirty="0" smtClean="0"/>
-              <a:t>What are K-</a:t>
-            </a:r>
-            <a:r>
-              <a:rPr lang="en-US" dirty="0" err="1" smtClean="0"/>
-              <a:t>mers</a:t>
-            </a:r>
+              <a:t>Kraken</a:t>
+            </a:r>
+            <a:endParaRPr lang="en-US" dirty="0"/>
+          </a:p>
+        </p:txBody>
+      </p:sp>
+      <p:sp>
+        <p:nvSpPr>
+          <p:cNvPr id="3" name="Content Placeholder 2"/>
+          <p:cNvSpPr>
+            <a:spLocks noGrp="1"/>
+          </p:cNvSpPr>
+          <p:nvPr>
+            <p:ph idx="1"/>
+          </p:nvPr>
+        </p:nvSpPr>
+        <p:spPr/>
+        <p:txBody>
+          <a:bodyPr>
+            <a:normAutofit lnSpcReduction="10000"/>
+          </a:bodyPr>
+          <a:lstStyle/>
+          <a:p>
+            <a:r>
+              <a:rPr lang="en-US" dirty="0" smtClean="0">
+                <a:solidFill>
+                  <a:schemeClr val="bg1">
+                    <a:lumMod val="85000"/>
+                  </a:schemeClr>
+                </a:solidFill>
+              </a:rPr>
+              <a:t>Matches sequence of each read against a database</a:t>
+            </a:r>
+          </a:p>
+          <a:p>
             <a:r>
               <a:rPr lang="en-US" dirty="0" smtClean="0"/>
-              <a:t>?</a:t>
-            </a:r>
-            <a:endParaRPr lang="en-US" dirty="0"/>
-          </a:p>
-        </p:txBody>
-      </p:sp>
-      <p:sp>
-        <p:nvSpPr>
-          <p:cNvPr id="3" name="Content Placeholder 2"/>
-          <p:cNvSpPr>
-            <a:spLocks noGrp="1"/>
-          </p:cNvSpPr>
-          <p:nvPr>
-            <p:ph idx="1"/>
-          </p:nvPr>
-        </p:nvSpPr>
-        <p:spPr/>
-        <p:txBody>
-          <a:bodyPr/>
-          <a:lstStyle/>
-          <a:p>
+              <a:t>Uses </a:t>
+            </a:r>
+            <a:r>
+              <a:rPr lang="en-US" u="sng" dirty="0" smtClean="0"/>
+              <a:t>k-</a:t>
+            </a:r>
+            <a:r>
+              <a:rPr lang="en-US" u="sng" dirty="0" err="1" smtClean="0"/>
+              <a:t>mer</a:t>
+            </a:r>
+            <a:r>
+              <a:rPr lang="en-US" u="sng" dirty="0" smtClean="0"/>
+              <a:t> </a:t>
+            </a:r>
             <a:r>
               <a:rPr lang="en-US" dirty="0" smtClean="0"/>
-              <a:t>Component text substrings of a sequence</a:t>
+              <a:t>matching</a:t>
             </a:r>
           </a:p>
           <a:p>
             <a:r>
               <a:rPr lang="en-US" dirty="0" smtClean="0"/>
-              <a:t>“K” refers to a number, </a:t>
+              <a:t>Alignment based methods (</a:t>
             </a:r>
             <a:r>
               <a:rPr lang="en-US" dirty="0" err="1" smtClean="0"/>
@@ -5889,7 +5950,7 @@
             </a:r>
             <a:r>
               <a:rPr lang="en-US" dirty="0" smtClean="0"/>
-              <a:t> 4-mer or 346-mer</a:t>
+              <a:t> BLAST) are too slow for the size of the database (all organisms) and the query database (millions of reads)</a:t>
             </a:r>
             <a:endParaRPr lang="en-US" dirty="0"/>
           </a:p>
@@ -5898,7 +5959,7 @@
     </p:spTree>
     <p:extLst>
       <p:ext uri="{BB962C8B-B14F-4D97-AF65-F5344CB8AC3E}">
-        <p14:creationId xmlns:p14="http://schemas.microsoft.com/office/powerpoint/2010/main" val="3177581651"/>
+        <p14:creationId xmlns:p14="http://schemas.microsoft.com/office/powerpoint/2010/main" val="4080729891"/>
       </p:ext>
     </p:extLst>
   </p:cSld>
@@ -5908,7 +5969,7 @@
   <p:timing>
     <p:tnLst>
       <p:par>
-        <p:cTn xmlns:p14="http://schemas.microsoft.com/office/powerpoint/2010/main" id="1" dur="indefinite" restart="never" nodeType="tmRoot"/>
+        <p:cTn id="1" dur="indefinite" restart="never" nodeType="tmRoot"/>
       </p:par>
     </p:tnLst>
   </p:timing>
@@ -5944,9 +6005,7 @@
         </p:nvSpPr>
         <p:spPr/>
         <p:txBody>
-          <a:bodyPr>
-            <a:normAutofit/>
-          </a:bodyPr>
+          <a:bodyPr/>
           <a:lstStyle/>
           <a:p>
             <a:r>
@@ -5965,56 +6024,38 @@
           </a:p>
         </p:txBody>
       </p:sp>
-      <p:pic>
-        <p:nvPicPr>
-          <p:cNvPr id="7" name="Content Placeholder 6" descr="Screenshot 2016-03-15 11.48.39.png"/>
-          <p:cNvPicPr>
-            <a:picLocks noGrp="1" noChangeAspect="1"/>
-          </p:cNvPicPr>
+      <p:sp>
+        <p:nvSpPr>
+          <p:cNvPr id="3" name="Content Placeholder 2"/>
+          <p:cNvSpPr>
+            <a:spLocks noGrp="1"/>
+          </p:cNvSpPr>
           <p:nvPr>
             <p:ph idx="1"/>
           </p:nvPr>
-        </p:nvPicPr>
-        <p:blipFill>
-          <a:blip r:embed="rId2">
-            <a:extLst>
-              <a:ext uri="{28A0092B-C50C-407E-A947-70E740481C1C}">
-                <a14:useLocalDpi xmlns:a14="http://schemas.microsoft.com/office/drawing/2010/main" val="0"/>
-              </a:ext>
-            </a:extLst>
-          </a:blip>
-          <a:srcRect t="-7918" b="-7918"/>
-          <a:stretch>
-            <a:fillRect/>
-          </a:stretch>
-        </p:blipFill>
+        </p:nvSpPr>
         <p:spPr/>
-      </p:pic>
-      <p:sp>
-        <p:nvSpPr>
-          <p:cNvPr id="5" name="TextBox 4"/>
-          <p:cNvSpPr txBox="1"/>
-          <p:nvPr/>
-        </p:nvSpPr>
-        <p:spPr>
-          <a:xfrm>
-            <a:off x="364868" y="4775542"/>
-            <a:ext cx="962949" cy="307777"/>
-          </a:xfrm>
-          <a:prstGeom prst="rect">
-            <a:avLst/>
-          </a:prstGeom>
-          <a:noFill/>
-        </p:spPr>
-        <p:txBody>
-          <a:bodyPr wrap="none" rtlCol="0">
-            <a:spAutoFit/>
-          </a:bodyPr>
+        <p:txBody>
+          <a:bodyPr/>
           <a:lstStyle/>
           <a:p>
             <a:r>
               <a:rPr lang="en-US" dirty="0" smtClean="0"/>
-              <a:t>Wikipedia</a:t>
+              <a:t>Component text substrings of a sequence</a:t>
+            </a:r>
+          </a:p>
+          <a:p>
+            <a:r>
+              <a:rPr lang="en-US" dirty="0" smtClean="0"/>
+              <a:t>“K” refers to a number, </a:t>
+            </a:r>
+            <a:r>
+              <a:rPr lang="en-US" dirty="0" err="1" smtClean="0"/>
+              <a:t>e.g</a:t>
+            </a:r>
+            <a:r>
+              <a:rPr lang="en-US" dirty="0" smtClean="0"/>
+              <a:t> 4-mer or 346-mer</a:t>
             </a:r>
             <a:endParaRPr lang="en-US" dirty="0"/>
           </a:p>
@@ -6023,7 +6064,7 @@
     </p:spTree>
     <p:extLst>
       <p:ext uri="{BB962C8B-B14F-4D97-AF65-F5344CB8AC3E}">
-        <p14:creationId xmlns:p14="http://schemas.microsoft.com/office/powerpoint/2010/main" val="1083799149"/>
+        <p14:creationId xmlns:p14="http://schemas.microsoft.com/office/powerpoint/2010/main" val="3177581651"/>
       </p:ext>
     </p:extLst>
   </p:cSld>
@@ -6033,7 +6074,7 @@
   <p:timing>
     <p:tnLst>
       <p:par>
-        <p:cTn xmlns:p14="http://schemas.microsoft.com/office/powerpoint/2010/main" id="1" dur="indefinite" restart="never" nodeType="tmRoot"/>
+        <p:cTn id="1" dur="indefinite" restart="never" nodeType="tmRoot"/>
       </p:par>
     </p:tnLst>
   </p:timing>
@@ -6069,6 +6110,131 @@
         </p:nvSpPr>
         <p:spPr/>
         <p:txBody>
+          <a:bodyPr>
+            <a:normAutofit/>
+          </a:bodyPr>
+          <a:lstStyle/>
+          <a:p>
+            <a:r>
+              <a:rPr lang="en-US" dirty="0" smtClean="0"/>
+              <a:t>What are K-</a:t>
+            </a:r>
+            <a:r>
+              <a:rPr lang="en-US" dirty="0" err="1" smtClean="0"/>
+              <a:t>mers</a:t>
+            </a:r>
+            <a:r>
+              <a:rPr lang="en-US" dirty="0" smtClean="0"/>
+              <a:t>?</a:t>
+            </a:r>
+            <a:endParaRPr lang="en-US" dirty="0"/>
+          </a:p>
+        </p:txBody>
+      </p:sp>
+      <p:pic>
+        <p:nvPicPr>
+          <p:cNvPr id="7" name="Content Placeholder 6" descr="Screenshot 2016-03-15 11.48.39.png"/>
+          <p:cNvPicPr>
+            <a:picLocks noGrp="1" noChangeAspect="1"/>
+          </p:cNvPicPr>
+          <p:nvPr>
+            <p:ph idx="1"/>
+          </p:nvPr>
+        </p:nvPicPr>
+        <p:blipFill>
+          <a:blip r:embed="rId2">
+            <a:extLst>
+              <a:ext uri="{28A0092B-C50C-407E-A947-70E740481C1C}">
+                <a14:useLocalDpi xmlns:a14="http://schemas.microsoft.com/office/drawing/2010/main" val="0"/>
+              </a:ext>
+            </a:extLst>
+          </a:blip>
+          <a:srcRect t="-7918" b="-7918"/>
+          <a:stretch>
+            <a:fillRect/>
+          </a:stretch>
+        </p:blipFill>
+        <p:spPr/>
+      </p:pic>
+      <p:sp>
+        <p:nvSpPr>
+          <p:cNvPr id="5" name="TextBox 4"/>
+          <p:cNvSpPr txBox="1"/>
+          <p:nvPr/>
+        </p:nvSpPr>
+        <p:spPr>
+          <a:xfrm>
+            <a:off x="364868" y="4775542"/>
+            <a:ext cx="962949" cy="307777"/>
+          </a:xfrm>
+          <a:prstGeom prst="rect">
+            <a:avLst/>
+          </a:prstGeom>
+          <a:noFill/>
+        </p:spPr>
+        <p:txBody>
+          <a:bodyPr wrap="none" rtlCol="0">
+            <a:spAutoFit/>
+          </a:bodyPr>
+          <a:lstStyle/>
+          <a:p>
+            <a:r>
+              <a:rPr lang="en-US" dirty="0" smtClean="0"/>
+              <a:t>Wikipedia</a:t>
+            </a:r>
+            <a:endParaRPr lang="en-US" dirty="0"/>
+          </a:p>
+        </p:txBody>
+      </p:sp>
+    </p:spTree>
+    <p:extLst>
+      <p:ext uri="{BB962C8B-B14F-4D97-AF65-F5344CB8AC3E}">
+        <p14:creationId xmlns:p14="http://schemas.microsoft.com/office/powerpoint/2010/main" val="1083799149"/>
+      </p:ext>
+    </p:extLst>
+  </p:cSld>
+  <p:clrMapOvr>
+    <a:masterClrMapping/>
+  </p:clrMapOvr>
+  <p:timing>
+    <p:tnLst>
+      <p:par>
+        <p:cTn id="1" dur="indefinite" restart="never" nodeType="tmRoot"/>
+      </p:par>
+    </p:tnLst>
+  </p:timing>
+</p:sld>
+</file>
+
+<file path=ppt/slides/slide18.xml><?xml version="1.0" encoding="utf-8"?>
+<p:sld xmlns:a="http://schemas.openxmlformats.org/drawingml/2006/main" xmlns:r="http://schemas.openxmlformats.org/officeDocument/2006/relationships" xmlns:p="http://schemas.openxmlformats.org/presentationml/2006/main">
+  <p:cSld>
+    <p:spTree>
+      <p:nvGrpSpPr>
+        <p:cNvPr id="1" name=""/>
+        <p:cNvGrpSpPr/>
+        <p:nvPr/>
+      </p:nvGrpSpPr>
+      <p:grpSpPr>
+        <a:xfrm>
+          <a:off x="0" y="0"/>
+          <a:ext cx="0" cy="0"/>
+          <a:chOff x="0" y="0"/>
+          <a:chExt cx="0" cy="0"/>
+        </a:xfrm>
+      </p:grpSpPr>
+      <p:sp>
+        <p:nvSpPr>
+          <p:cNvPr id="2" name="Title 1"/>
+          <p:cNvSpPr>
+            <a:spLocks noGrp="1"/>
+          </p:cNvSpPr>
+          <p:nvPr>
+            <p:ph type="title"/>
+          </p:nvPr>
+        </p:nvSpPr>
+        <p:spPr/>
+        <p:txBody>
           <a:bodyPr/>
           <a:lstStyle/>
           <a:p>
@@ -6175,14 +6341,14 @@
   <p:timing>
     <p:tnLst>
       <p:par>
-        <p:cTn xmlns:p14="http://schemas.microsoft.com/office/powerpoint/2010/main" id="1" dur="indefinite" restart="never" nodeType="tmRoot"/>
+        <p:cTn id="1" dur="indefinite" restart="never" nodeType="tmRoot"/>
       </p:par>
     </p:tnLst>
   </p:timing>
 </p:sld>
 </file>
 
-<file path=ppt/slides/slide18.xml><?xml version="1.0" encoding="utf-8"?>
+<file path=ppt/slides/slide19.xml><?xml version="1.0" encoding="utf-8"?>
 <p:sld xmlns:a="http://schemas.openxmlformats.org/drawingml/2006/main" xmlns:r="http://schemas.openxmlformats.org/officeDocument/2006/relationships" xmlns:p="http://schemas.openxmlformats.org/presentationml/2006/main">
   <p:cSld>
     <p:spTree>
@@ -6260,14 +6426,137 @@
   <p:timing>
     <p:tnLst>
       <p:par>
-        <p:cTn xmlns:p14="http://schemas.microsoft.com/office/powerpoint/2010/main" id="1" dur="indefinite" restart="never" nodeType="tmRoot"/>
+        <p:cTn id="1" dur="indefinite" restart="never" nodeType="tmRoot"/>
       </p:par>
     </p:tnLst>
   </p:timing>
 </p:sld>
 </file>
 
-<file path=ppt/slides/slide19.xml><?xml version="1.0" encoding="utf-8"?>
+<file path=ppt/slides/slide2.xml><?xml version="1.0" encoding="utf-8"?>
+<p:sld xmlns:a="http://schemas.openxmlformats.org/drawingml/2006/main" xmlns:r="http://schemas.openxmlformats.org/officeDocument/2006/relationships" xmlns:p="http://schemas.openxmlformats.org/presentationml/2006/main">
+  <p:cSld>
+    <p:spTree>
+      <p:nvGrpSpPr>
+        <p:cNvPr id="1" name=""/>
+        <p:cNvGrpSpPr/>
+        <p:nvPr/>
+      </p:nvGrpSpPr>
+      <p:grpSpPr>
+        <a:xfrm>
+          <a:off x="0" y="0"/>
+          <a:ext cx="0" cy="0"/>
+          <a:chOff x="0" y="0"/>
+          <a:chExt cx="0" cy="0"/>
+        </a:xfrm>
+      </p:grpSpPr>
+      <p:sp>
+        <p:nvSpPr>
+          <p:cNvPr id="2" name="Title 1"/>
+          <p:cNvSpPr>
+            <a:spLocks noGrp="1"/>
+          </p:cNvSpPr>
+          <p:nvPr>
+            <p:ph type="title"/>
+          </p:nvPr>
+        </p:nvSpPr>
+        <p:spPr>
+          <a:xfrm>
+            <a:off x="1485900" y="205979"/>
+            <a:ext cx="6172200" cy="321459"/>
+          </a:xfrm>
+        </p:spPr>
+        <p:txBody>
+          <a:bodyPr>
+            <a:normAutofit fontScale="90000"/>
+          </a:bodyPr>
+          <a:lstStyle/>
+          <a:p>
+            <a:r>
+              <a:rPr lang="en-US" dirty="0" smtClean="0"/>
+              <a:t>DNA-based </a:t>
+            </a:r>
+            <a:r>
+              <a:rPr lang="en-US" dirty="0" err="1" smtClean="0"/>
+              <a:t>microbiome</a:t>
+            </a:r>
+            <a:r>
+              <a:rPr lang="en-US" dirty="0" smtClean="0"/>
+              <a:t> studies</a:t>
+            </a:r>
+            <a:endParaRPr lang="en-US" dirty="0"/>
+          </a:p>
+        </p:txBody>
+      </p:sp>
+      <p:pic>
+        <p:nvPicPr>
+          <p:cNvPr id="4" name="Picture 3"/>
+          <p:cNvPicPr>
+            <a:picLocks noChangeAspect="1"/>
+          </p:cNvPicPr>
+          <p:nvPr/>
+        </p:nvPicPr>
+        <p:blipFill>
+          <a:blip r:embed="rId2"/>
+          <a:stretch>
+            <a:fillRect/>
+          </a:stretch>
+        </p:blipFill>
+        <p:spPr>
+          <a:xfrm>
+            <a:off x="2063469" y="784315"/>
+            <a:ext cx="4762500" cy="4076700"/>
+          </a:xfrm>
+          <a:prstGeom prst="rect">
+            <a:avLst/>
+          </a:prstGeom>
+          <a:ln w="12700">
+            <a:solidFill>
+              <a:schemeClr val="tx1"/>
+            </a:solidFill>
+          </a:ln>
+        </p:spPr>
+      </p:pic>
+      <p:pic>
+        <p:nvPicPr>
+          <p:cNvPr id="7" name="Picture 255" descr="nature11234-f2"/>
+          <p:cNvPicPr>
+            <a:picLocks noChangeAspect="1" noChangeArrowheads="1"/>
+          </p:cNvPicPr>
+          <p:nvPr/>
+        </p:nvPicPr>
+        <p:blipFill>
+          <a:blip r:embed="rId3"/>
+          <a:srcRect/>
+          <a:stretch>
+            <a:fillRect/>
+          </a:stretch>
+        </p:blipFill>
+        <p:spPr bwMode="auto">
+          <a:xfrm>
+            <a:off x="3690366" y="4494431"/>
+            <a:ext cx="1915661" cy="733168"/>
+          </a:xfrm>
+          <a:prstGeom prst="rect">
+            <a:avLst/>
+          </a:prstGeom>
+          <a:noFill/>
+        </p:spPr>
+      </p:pic>
+    </p:spTree>
+    <p:extLst>
+      <p:ext uri="{BB962C8B-B14F-4D97-AF65-F5344CB8AC3E}">
+        <p14:creationId xmlns:p14="http://schemas.microsoft.com/office/powerpoint/2010/main" val="205565713"/>
+      </p:ext>
+    </p:extLst>
+  </p:cSld>
+  <p:clrMapOvr>
+    <a:masterClrMapping/>
+  </p:clrMapOvr>
+</p:sld>
+</file>
+
+<file path=ppt/slides/slide20.xml><?xml version="1.0" encoding="utf-8"?>
 <p:sld xmlns:a="http://schemas.openxmlformats.org/drawingml/2006/main" xmlns:r="http://schemas.openxmlformats.org/officeDocument/2006/relationships" xmlns:p="http://schemas.openxmlformats.org/presentationml/2006/main">
   <p:cSld>
     <p:spTree>
@@ -6339,37 +6628,8 @@
                 <a:ea typeface="+mj-ea"/>
                 <a:cs typeface="+mj-cs"/>
               </a:rPr>
-              <a:t>Assigning </a:t>
-            </a:r>
-            <a:r>
-              <a:rPr lang="en-GB" sz="4000" dirty="0" smtClean="0">
-                <a:latin typeface="+mj-lt"/>
-                <a:ea typeface="+mj-ea"/>
-                <a:cs typeface="+mj-cs"/>
-              </a:rPr>
-              <a:t>Last </a:t>
-            </a:r>
-            <a:r>
-              <a:rPr lang="en-GB" sz="4000" dirty="0" smtClean="0">
-                <a:latin typeface="+mj-lt"/>
-                <a:ea typeface="+mj-ea"/>
-                <a:cs typeface="+mj-cs"/>
-              </a:rPr>
-              <a:t>Common </a:t>
-            </a:r>
-            <a:r>
-              <a:rPr lang="en-GB" sz="4000" dirty="0" smtClean="0">
-                <a:latin typeface="+mj-lt"/>
-                <a:ea typeface="+mj-ea"/>
-                <a:cs typeface="+mj-cs"/>
-              </a:rPr>
-              <a:t>Ancestor</a:t>
-            </a:r>
-            <a:endParaRPr lang="en-GB" sz="4000" dirty="0" smtClean="0">
-              <a:latin typeface="+mj-lt"/>
-              <a:ea typeface="+mj-ea"/>
-              <a:cs typeface="+mj-cs"/>
-            </a:endParaRPr>
+              <a:t>Assigning Last Common Ancestor</a:t>
+            </a:r>
           </a:p>
         </p:txBody>
       </p:sp>
@@ -6596,11 +6856,11 @@
   <p:clrMapOvr>
     <a:masterClrMapping/>
   </p:clrMapOvr>
-  <p:transition xmlns:p14="http://schemas.microsoft.com/office/powerpoint/2010/main" spd="med"/>
+  <p:transition spd="med"/>
   <p:timing>
     <p:tnLst>
       <p:par>
-        <p:cTn xmlns:p14="http://schemas.microsoft.com/office/powerpoint/2010/main" id="1" dur="indefinite" restart="never" nodeType="tmRoot">
+        <p:cTn id="1" dur="indefinite" restart="never" nodeType="tmRoot">
           <p:childTnLst>
             <p:seq concurrent="1" nextAc="seek">
               <p:cTn id="2" dur="0" nodeType="mainSeq"/>
@@ -6627,7 +6887,692 @@
 </p:sld>
 </file>
 
-<file path=ppt/slides/slide2.xml><?xml version="1.0" encoding="utf-8"?>
+<file path=ppt/slides/slide21.xml><?xml version="1.0" encoding="utf-8"?>
+<p:sld xmlns:a="http://schemas.openxmlformats.org/drawingml/2006/main" xmlns:r="http://schemas.openxmlformats.org/officeDocument/2006/relationships" xmlns:p="http://schemas.openxmlformats.org/presentationml/2006/main">
+  <p:cSld>
+    <p:spTree>
+      <p:nvGrpSpPr>
+        <p:cNvPr id="1" name=""/>
+        <p:cNvGrpSpPr/>
+        <p:nvPr/>
+      </p:nvGrpSpPr>
+      <p:grpSpPr>
+        <a:xfrm>
+          <a:off x="0" y="0"/>
+          <a:ext cx="0" cy="0"/>
+          <a:chOff x="0" y="0"/>
+          <a:chExt cx="0" cy="0"/>
+        </a:xfrm>
+      </p:grpSpPr>
+      <p:sp>
+        <p:nvSpPr>
+          <p:cNvPr id="2" name="Title 1"/>
+          <p:cNvSpPr>
+            <a:spLocks noGrp="1"/>
+          </p:cNvSpPr>
+          <p:nvPr>
+            <p:ph type="title"/>
+          </p:nvPr>
+        </p:nvSpPr>
+        <p:spPr/>
+        <p:txBody>
+          <a:bodyPr/>
+          <a:lstStyle/>
+          <a:p>
+            <a:r>
+              <a:rPr lang="en-US" dirty="0" smtClean="0"/>
+              <a:t>How Kraken Works (2)</a:t>
+            </a:r>
+            <a:endParaRPr lang="en-US" dirty="0"/>
+          </a:p>
+        </p:txBody>
+      </p:sp>
+      <p:sp>
+        <p:nvSpPr>
+          <p:cNvPr id="3" name="Content Placeholder 2"/>
+          <p:cNvSpPr>
+            <a:spLocks noGrp="1"/>
+          </p:cNvSpPr>
+          <p:nvPr>
+            <p:ph idx="1"/>
+          </p:nvPr>
+        </p:nvSpPr>
+        <p:spPr/>
+        <p:txBody>
+          <a:bodyPr/>
+          <a:lstStyle/>
+          <a:p>
+            <a:r>
+              <a:rPr lang="en-US" dirty="0" smtClean="0"/>
+              <a:t>For each read of a query, decompose into k-</a:t>
+            </a:r>
+            <a:r>
+              <a:rPr lang="en-US" dirty="0" err="1" smtClean="0"/>
+              <a:t>mers</a:t>
+            </a:r>
+            <a:endParaRPr lang="en-US" dirty="0" smtClean="0"/>
+          </a:p>
+          <a:p>
+            <a:r>
+              <a:rPr lang="en-US" dirty="0" smtClean="0"/>
+              <a:t>Find LCA of each k-</a:t>
+            </a:r>
+            <a:r>
+              <a:rPr lang="en-US" dirty="0" err="1" smtClean="0"/>
+              <a:t>mer</a:t>
+            </a:r>
+            <a:r>
+              <a:rPr lang="en-US" dirty="0" smtClean="0"/>
+              <a:t> </a:t>
+            </a:r>
+            <a:r>
+              <a:rPr lang="en-US" dirty="0" smtClean="0"/>
+              <a:t>from </a:t>
+            </a:r>
+            <a:r>
+              <a:rPr lang="en-US" dirty="0" smtClean="0"/>
+              <a:t>database</a:t>
+            </a:r>
+          </a:p>
+          <a:p>
+            <a:r>
+              <a:rPr lang="en-US" dirty="0" smtClean="0"/>
+              <a:t>Score most probable assignment of each read based on all the k-</a:t>
+            </a:r>
+            <a:r>
+              <a:rPr lang="en-US" dirty="0" err="1" smtClean="0"/>
+              <a:t>mers</a:t>
+            </a:r>
+            <a:endParaRPr lang="en-US" dirty="0"/>
+          </a:p>
+        </p:txBody>
+      </p:sp>
+    </p:spTree>
+    <p:extLst>
+      <p:ext uri="{BB962C8B-B14F-4D97-AF65-F5344CB8AC3E}">
+        <p14:creationId xmlns:p14="http://schemas.microsoft.com/office/powerpoint/2010/main" val="466722915"/>
+      </p:ext>
+    </p:extLst>
+  </p:cSld>
+  <p:clrMapOvr>
+    <a:masterClrMapping/>
+  </p:clrMapOvr>
+  <p:timing>
+    <p:tnLst>
+      <p:par>
+        <p:cTn id="1" dur="indefinite" restart="never" nodeType="tmRoot"/>
+      </p:par>
+    </p:tnLst>
+  </p:timing>
+</p:sld>
+</file>
+
+<file path=ppt/slides/slide22.xml><?xml version="1.0" encoding="utf-8"?>
+<p:sld xmlns:a="http://schemas.openxmlformats.org/drawingml/2006/main" xmlns:r="http://schemas.openxmlformats.org/officeDocument/2006/relationships" xmlns:p="http://schemas.openxmlformats.org/presentationml/2006/main">
+  <p:cSld>
+    <p:spTree>
+      <p:nvGrpSpPr>
+        <p:cNvPr id="1" name="Shape 393"/>
+        <p:cNvGrpSpPr/>
+        <p:nvPr/>
+      </p:nvGrpSpPr>
+      <p:grpSpPr>
+        <a:xfrm>
+          <a:off x="0" y="0"/>
+          <a:ext cx="0" cy="0"/>
+          <a:chOff x="0" y="0"/>
+          <a:chExt cx="0" cy="0"/>
+        </a:xfrm>
+      </p:grpSpPr>
+      <p:sp>
+        <p:nvSpPr>
+          <p:cNvPr id="394" name="Shape 394"/>
+          <p:cNvSpPr txBox="1">
+            <a:spLocks noGrp="1"/>
+          </p:cNvSpPr>
+          <p:nvPr>
+            <p:ph type="title"/>
+          </p:nvPr>
+        </p:nvSpPr>
+        <p:spPr>
+          <a:prstGeom prst="rect">
+            <a:avLst/>
+          </a:prstGeom>
+          <a:noFill/>
+          <a:ln>
+            <a:noFill/>
+          </a:ln>
+        </p:spPr>
+        <p:txBody>
+          <a:bodyPr lIns="91425" tIns="45700" rIns="91425" bIns="45700" anchor="ctr" anchorCtr="0">
+            <a:noAutofit/>
+          </a:bodyPr>
+          <a:lstStyle/>
+          <a:p>
+            <a:pPr marL="0" marR="0" lvl="0" indent="0" algn="ctr" rtl="0">
+              <a:spcBef>
+                <a:spcPts val="0"/>
+              </a:spcBef>
+              <a:buClr>
+                <a:schemeClr val="dk1"/>
+              </a:buClr>
+              <a:buSzPct val="25000"/>
+              <a:buFont typeface="Calibri"/>
+              <a:buNone/>
+            </a:pPr>
+            <a:r>
+              <a:rPr lang="en-US" sz="4400" b="0" i="0" u="none" strike="noStrike" cap="none" dirty="0">
+                <a:solidFill>
+                  <a:schemeClr val="dk1"/>
+                </a:solidFill>
+                <a:latin typeface="Calibri"/>
+                <a:ea typeface="Calibri"/>
+                <a:cs typeface="Calibri"/>
+                <a:sym typeface="Calibri"/>
+              </a:rPr>
+              <a:t>Kraken </a:t>
+            </a:r>
+            <a:r>
+              <a:rPr lang="en-US" sz="4400" b="0" i="0" u="none" strike="noStrike" cap="none" dirty="0" smtClean="0">
+                <a:solidFill>
+                  <a:schemeClr val="dk1"/>
+                </a:solidFill>
+                <a:latin typeface="Calibri"/>
+                <a:ea typeface="Calibri"/>
+                <a:cs typeface="Calibri"/>
+                <a:sym typeface="Calibri"/>
+              </a:rPr>
+              <a:t>scoring</a:t>
+            </a:r>
+            <a:endParaRPr lang="en-US" sz="4400" b="0" i="0" u="none" strike="noStrike" cap="none" dirty="0">
+              <a:solidFill>
+                <a:schemeClr val="dk1"/>
+              </a:solidFill>
+              <a:latin typeface="Calibri"/>
+              <a:ea typeface="Calibri"/>
+              <a:cs typeface="Calibri"/>
+              <a:sym typeface="Calibri"/>
+            </a:endParaRPr>
+          </a:p>
+        </p:txBody>
+      </p:sp>
+      <p:pic>
+        <p:nvPicPr>
+          <p:cNvPr id="395" name="Shape 395"/>
+          <p:cNvPicPr preferRelativeResize="0">
+            <a:picLocks noGrp="1"/>
+          </p:cNvPicPr>
+          <p:nvPr>
+            <p:ph idx="1"/>
+          </p:nvPr>
+        </p:nvPicPr>
+        <p:blipFill rotWithShape="1">
+          <a:blip r:embed="rId3">
+            <a:alphaModFix/>
+          </a:blip>
+          <a:srcRect l="-24611" r="-24611"/>
+          <a:stretch/>
+        </p:blipFill>
+        <p:spPr>
+          <a:xfrm>
+            <a:off x="457200" y="1200151"/>
+            <a:ext cx="8229600" cy="3394472"/>
+          </a:xfrm>
+          <a:prstGeom prst="rect">
+            <a:avLst/>
+          </a:prstGeom>
+          <a:noFill/>
+          <a:ln>
+            <a:noFill/>
+          </a:ln>
+        </p:spPr>
+      </p:pic>
+      <p:sp>
+        <p:nvSpPr>
+          <p:cNvPr id="2" name="Oval Callout 1"/>
+          <p:cNvSpPr/>
+          <p:nvPr/>
+        </p:nvSpPr>
+        <p:spPr>
+          <a:xfrm>
+            <a:off x="274589" y="669283"/>
+            <a:ext cx="1878426" cy="1317782"/>
+          </a:xfrm>
+          <a:prstGeom prst="wedgeEllipseCallout">
+            <a:avLst>
+              <a:gd name="adj1" fmla="val 89073"/>
+              <a:gd name="adj2" fmla="val 101421"/>
+            </a:avLst>
+          </a:prstGeom>
+        </p:spPr>
+        <p:style>
+          <a:lnRef idx="1">
+            <a:schemeClr val="accent1"/>
+          </a:lnRef>
+          <a:fillRef idx="3">
+            <a:schemeClr val="accent1"/>
+          </a:fillRef>
+          <a:effectRef idx="2">
+            <a:schemeClr val="accent1"/>
+          </a:effectRef>
+          <a:fontRef idx="minor">
+            <a:schemeClr val="lt1"/>
+          </a:fontRef>
+        </p:style>
+        <p:txBody>
+          <a:bodyPr rtlCol="0" anchor="ctr"/>
+          <a:lstStyle/>
+          <a:p>
+            <a:pPr algn="ctr"/>
+            <a:r>
+              <a:rPr lang="en-US" dirty="0" smtClean="0"/>
+              <a:t>1. Map K-</a:t>
+            </a:r>
+            <a:r>
+              <a:rPr lang="en-US" dirty="0" err="1" smtClean="0"/>
+              <a:t>mers</a:t>
+            </a:r>
+            <a:r>
+              <a:rPr lang="en-US" dirty="0" smtClean="0"/>
+              <a:t> in database to taxon tree</a:t>
+            </a:r>
+            <a:endParaRPr lang="en-US" dirty="0"/>
+          </a:p>
+        </p:txBody>
+      </p:sp>
+    </p:spTree>
+    <p:extLst>
+      <p:ext uri="{BB962C8B-B14F-4D97-AF65-F5344CB8AC3E}">
+        <p14:creationId xmlns:p14="http://schemas.microsoft.com/office/powerpoint/2010/main" val="3443749673"/>
+      </p:ext>
+    </p:extLst>
+  </p:cSld>
+  <p:clrMapOvr>
+    <a:masterClrMapping/>
+  </p:clrMapOvr>
+  <p:transition spd="slow">
+    <p:cut/>
+  </p:transition>
+  <p:timing>
+    <p:tnLst>
+      <p:par>
+        <p:cTn id="1" dur="indefinite" restart="never" nodeType="tmRoot"/>
+      </p:par>
+    </p:tnLst>
+  </p:timing>
+</p:sld>
+</file>
+
+<file path=ppt/slides/slide23.xml><?xml version="1.0" encoding="utf-8"?>
+<p:sld xmlns:a="http://schemas.openxmlformats.org/drawingml/2006/main" xmlns:r="http://schemas.openxmlformats.org/officeDocument/2006/relationships" xmlns:p="http://schemas.openxmlformats.org/presentationml/2006/main">
+  <p:cSld>
+    <p:spTree>
+      <p:nvGrpSpPr>
+        <p:cNvPr id="1" name="Shape 393"/>
+        <p:cNvGrpSpPr/>
+        <p:nvPr/>
+      </p:nvGrpSpPr>
+      <p:grpSpPr>
+        <a:xfrm>
+          <a:off x="0" y="0"/>
+          <a:ext cx="0" cy="0"/>
+          <a:chOff x="0" y="0"/>
+          <a:chExt cx="0" cy="0"/>
+        </a:xfrm>
+      </p:grpSpPr>
+      <p:sp>
+        <p:nvSpPr>
+          <p:cNvPr id="394" name="Shape 394"/>
+          <p:cNvSpPr txBox="1">
+            <a:spLocks noGrp="1"/>
+          </p:cNvSpPr>
+          <p:nvPr>
+            <p:ph type="title"/>
+          </p:nvPr>
+        </p:nvSpPr>
+        <p:spPr>
+          <a:prstGeom prst="rect">
+            <a:avLst/>
+          </a:prstGeom>
+          <a:noFill/>
+          <a:ln>
+            <a:noFill/>
+          </a:ln>
+        </p:spPr>
+        <p:txBody>
+          <a:bodyPr lIns="91425" tIns="45700" rIns="91425" bIns="45700" anchor="ctr" anchorCtr="0">
+            <a:noAutofit/>
+          </a:bodyPr>
+          <a:lstStyle/>
+          <a:p>
+            <a:pPr marL="0" marR="0" lvl="0" indent="0" algn="ctr" rtl="0">
+              <a:spcBef>
+                <a:spcPts val="0"/>
+              </a:spcBef>
+              <a:buClr>
+                <a:schemeClr val="dk1"/>
+              </a:buClr>
+              <a:buSzPct val="25000"/>
+              <a:buFont typeface="Calibri"/>
+              <a:buNone/>
+            </a:pPr>
+            <a:r>
+              <a:rPr lang="en-US" sz="4400" b="0" i="0" u="none" strike="noStrike" cap="none" dirty="0">
+                <a:solidFill>
+                  <a:schemeClr val="dk1"/>
+                </a:solidFill>
+                <a:latin typeface="Calibri"/>
+                <a:ea typeface="Calibri"/>
+                <a:cs typeface="Calibri"/>
+                <a:sym typeface="Calibri"/>
+              </a:rPr>
+              <a:t>Kraken </a:t>
+            </a:r>
+            <a:r>
+              <a:rPr lang="en-US" sz="4400" b="0" i="0" u="none" strike="noStrike" cap="none" dirty="0" smtClean="0">
+                <a:solidFill>
+                  <a:schemeClr val="dk1"/>
+                </a:solidFill>
+                <a:latin typeface="Calibri"/>
+                <a:ea typeface="Calibri"/>
+                <a:cs typeface="Calibri"/>
+                <a:sym typeface="Calibri"/>
+              </a:rPr>
+              <a:t>scoring</a:t>
+            </a:r>
+            <a:endParaRPr lang="en-US" sz="4400" b="0" i="0" u="none" strike="noStrike" cap="none" dirty="0">
+              <a:solidFill>
+                <a:schemeClr val="dk1"/>
+              </a:solidFill>
+              <a:latin typeface="Calibri"/>
+              <a:ea typeface="Calibri"/>
+              <a:cs typeface="Calibri"/>
+              <a:sym typeface="Calibri"/>
+            </a:endParaRPr>
+          </a:p>
+        </p:txBody>
+      </p:sp>
+      <p:pic>
+        <p:nvPicPr>
+          <p:cNvPr id="395" name="Shape 395"/>
+          <p:cNvPicPr preferRelativeResize="0">
+            <a:picLocks noGrp="1"/>
+          </p:cNvPicPr>
+          <p:nvPr>
+            <p:ph idx="1"/>
+          </p:nvPr>
+        </p:nvPicPr>
+        <p:blipFill rotWithShape="1">
+          <a:blip r:embed="rId3">
+            <a:alphaModFix/>
+          </a:blip>
+          <a:srcRect l="-24611" r="-24611"/>
+          <a:stretch/>
+        </p:blipFill>
+        <p:spPr>
+          <a:xfrm>
+            <a:off x="457200" y="1200151"/>
+            <a:ext cx="8229600" cy="3394472"/>
+          </a:xfrm>
+          <a:prstGeom prst="rect">
+            <a:avLst/>
+          </a:prstGeom>
+          <a:noFill/>
+          <a:ln>
+            <a:noFill/>
+          </a:ln>
+        </p:spPr>
+      </p:pic>
+      <p:sp>
+        <p:nvSpPr>
+          <p:cNvPr id="4" name="Oval Callout 3"/>
+          <p:cNvSpPr/>
+          <p:nvPr/>
+        </p:nvSpPr>
+        <p:spPr>
+          <a:xfrm>
+            <a:off x="6101007" y="379690"/>
+            <a:ext cx="2334434" cy="1607375"/>
+          </a:xfrm>
+          <a:prstGeom prst="wedgeEllipseCallout">
+            <a:avLst>
+              <a:gd name="adj1" fmla="val -56839"/>
+              <a:gd name="adj2" fmla="val 69674"/>
+            </a:avLst>
+          </a:prstGeom>
+        </p:spPr>
+        <p:style>
+          <a:lnRef idx="1">
+            <a:schemeClr val="accent1"/>
+          </a:lnRef>
+          <a:fillRef idx="3">
+            <a:schemeClr val="accent1"/>
+          </a:fillRef>
+          <a:effectRef idx="2">
+            <a:schemeClr val="accent1"/>
+          </a:effectRef>
+          <a:fontRef idx="minor">
+            <a:schemeClr val="lt1"/>
+          </a:fontRef>
+        </p:style>
+        <p:txBody>
+          <a:bodyPr rtlCol="0" anchor="ctr"/>
+          <a:lstStyle/>
+          <a:p>
+            <a:pPr algn="ctr"/>
+            <a:r>
+              <a:rPr lang="en-US" dirty="0" smtClean="0"/>
+              <a:t>Assign to a taxon based on weighted scoring method</a:t>
+            </a:r>
+            <a:endParaRPr lang="en-US" dirty="0"/>
+          </a:p>
+        </p:txBody>
+      </p:sp>
+    </p:spTree>
+    <p:extLst>
+      <p:ext uri="{BB962C8B-B14F-4D97-AF65-F5344CB8AC3E}">
+        <p14:creationId xmlns:p14="http://schemas.microsoft.com/office/powerpoint/2010/main" val="323564138"/>
+      </p:ext>
+    </p:extLst>
+  </p:cSld>
+  <p:clrMapOvr>
+    <a:masterClrMapping/>
+  </p:clrMapOvr>
+  <p:transition spd="slow">
+    <p:cut/>
+  </p:transition>
+  <p:timing>
+    <p:tnLst>
+      <p:par>
+        <p:cTn id="1" dur="indefinite" restart="never" nodeType="tmRoot"/>
+      </p:par>
+    </p:tnLst>
+  </p:timing>
+</p:sld>
+</file>
+
+<file path=ppt/slides/slide24.xml><?xml version="1.0" encoding="utf-8"?>
+<p:sld xmlns:a="http://schemas.openxmlformats.org/drawingml/2006/main" xmlns:r="http://schemas.openxmlformats.org/officeDocument/2006/relationships" xmlns:p="http://schemas.openxmlformats.org/presentationml/2006/main">
+  <p:cSld>
+    <p:spTree>
+      <p:nvGrpSpPr>
+        <p:cNvPr id="1" name=""/>
+        <p:cNvGrpSpPr/>
+        <p:nvPr/>
+      </p:nvGrpSpPr>
+      <p:grpSpPr>
+        <a:xfrm>
+          <a:off x="0" y="0"/>
+          <a:ext cx="0" cy="0"/>
+          <a:chOff x="0" y="0"/>
+          <a:chExt cx="0" cy="0"/>
+        </a:xfrm>
+      </p:grpSpPr>
+      <p:sp>
+        <p:nvSpPr>
+          <p:cNvPr id="2" name="Title 1"/>
+          <p:cNvSpPr>
+            <a:spLocks noGrp="1"/>
+          </p:cNvSpPr>
+          <p:nvPr>
+            <p:ph type="title"/>
+          </p:nvPr>
+        </p:nvSpPr>
+        <p:spPr/>
+        <p:txBody>
+          <a:bodyPr/>
+          <a:lstStyle/>
+          <a:p>
+            <a:r>
+              <a:rPr lang="en-US" dirty="0" smtClean="0"/>
+              <a:t>Test results</a:t>
+            </a:r>
+            <a:endParaRPr lang="en-US" dirty="0"/>
+          </a:p>
+        </p:txBody>
+      </p:sp>
+      <p:pic>
+        <p:nvPicPr>
+          <p:cNvPr id="4" name="Content Placeholder 3" descr="Screenshot 2016-03-15 12.52.34.png"/>
+          <p:cNvPicPr>
+            <a:picLocks noGrp="1" noChangeAspect="1"/>
+          </p:cNvPicPr>
+          <p:nvPr>
+            <p:ph idx="1"/>
+          </p:nvPr>
+        </p:nvPicPr>
+        <p:blipFill>
+          <a:blip r:embed="rId2">
+            <a:extLst>
+              <a:ext uri="{28A0092B-C50C-407E-A947-70E740481C1C}">
+                <a14:useLocalDpi xmlns:a14="http://schemas.microsoft.com/office/drawing/2010/main" val="0"/>
+              </a:ext>
+            </a:extLst>
+          </a:blip>
+          <a:srcRect l="-8823" r="-8823"/>
+          <a:stretch>
+            <a:fillRect/>
+          </a:stretch>
+        </p:blipFill>
+        <p:spPr/>
+      </p:pic>
+    </p:spTree>
+    <p:extLst>
+      <p:ext uri="{BB962C8B-B14F-4D97-AF65-F5344CB8AC3E}">
+        <p14:creationId xmlns:p14="http://schemas.microsoft.com/office/powerpoint/2010/main" val="3918438209"/>
+      </p:ext>
+    </p:extLst>
+  </p:cSld>
+  <p:clrMapOvr>
+    <a:masterClrMapping/>
+  </p:clrMapOvr>
+  <p:timing>
+    <p:tnLst>
+      <p:par>
+        <p:cTn id="1" dur="indefinite" restart="never" nodeType="tmRoot"/>
+      </p:par>
+    </p:tnLst>
+  </p:timing>
+</p:sld>
+</file>
+
+<file path=ppt/slides/slide25.xml><?xml version="1.0" encoding="utf-8"?>
+<p:sld xmlns:a="http://schemas.openxmlformats.org/drawingml/2006/main" xmlns:r="http://schemas.openxmlformats.org/officeDocument/2006/relationships" xmlns:p="http://schemas.openxmlformats.org/presentationml/2006/main">
+  <p:cSld>
+    <p:spTree>
+      <p:nvGrpSpPr>
+        <p:cNvPr id="1" name=""/>
+        <p:cNvGrpSpPr/>
+        <p:nvPr/>
+      </p:nvGrpSpPr>
+      <p:grpSpPr>
+        <a:xfrm>
+          <a:off x="0" y="0"/>
+          <a:ext cx="0" cy="0"/>
+          <a:chOff x="0" y="0"/>
+          <a:chExt cx="0" cy="0"/>
+        </a:xfrm>
+      </p:grpSpPr>
+      <p:sp>
+        <p:nvSpPr>
+          <p:cNvPr id="2" name="Title 1"/>
+          <p:cNvSpPr>
+            <a:spLocks noGrp="1"/>
+          </p:cNvSpPr>
+          <p:nvPr>
+            <p:ph type="title"/>
+          </p:nvPr>
+        </p:nvSpPr>
+        <p:spPr/>
+        <p:txBody>
+          <a:bodyPr/>
+          <a:lstStyle/>
+          <a:p>
+            <a:r>
+              <a:rPr lang="en-US" dirty="0" smtClean="0"/>
+              <a:t>Metagenome assignment</a:t>
+            </a:r>
+            <a:endParaRPr lang="en-US" dirty="0"/>
+          </a:p>
+        </p:txBody>
+      </p:sp>
+      <p:sp>
+        <p:nvSpPr>
+          <p:cNvPr id="3" name="Content Placeholder 2"/>
+          <p:cNvSpPr>
+            <a:spLocks noGrp="1"/>
+          </p:cNvSpPr>
+          <p:nvPr>
+            <p:ph idx="1"/>
+          </p:nvPr>
+        </p:nvSpPr>
+        <p:spPr/>
+        <p:txBody>
+          <a:bodyPr/>
+          <a:lstStyle/>
+          <a:p>
+            <a:r>
+              <a:rPr lang="en-US" dirty="0"/>
+              <a:t>https://</a:t>
+            </a:r>
+            <a:r>
+              <a:rPr lang="en-US" dirty="0" err="1"/>
+              <a:t>github.com</a:t>
+            </a:r>
+            <a:r>
+              <a:rPr lang="en-US" dirty="0"/>
+              <a:t>/IBS574/</a:t>
+            </a:r>
+            <a:r>
+              <a:rPr lang="en-US" dirty="0" err="1"/>
+              <a:t>metagenome_assignment</a:t>
+            </a:r>
+            <a:r>
+              <a:rPr lang="en-US" dirty="0"/>
+              <a:t>/blob/master/</a:t>
+            </a:r>
+            <a:r>
+              <a:rPr lang="en-US" dirty="0" err="1"/>
+              <a:t>metagenomic_exercise.md</a:t>
+            </a:r>
+            <a:endParaRPr lang="en-US" dirty="0"/>
+          </a:p>
+        </p:txBody>
+      </p:sp>
+    </p:spTree>
+    <p:extLst>
+      <p:ext uri="{BB962C8B-B14F-4D97-AF65-F5344CB8AC3E}">
+        <p14:creationId xmlns:p14="http://schemas.microsoft.com/office/powerpoint/2010/main" val="841196468"/>
+      </p:ext>
+    </p:extLst>
+  </p:cSld>
+  <p:clrMapOvr>
+    <a:masterClrMapping/>
+  </p:clrMapOvr>
+</p:sld>
+</file>
+
+<file path=ppt/slides/slide3.xml><?xml version="1.0" encoding="utf-8"?>
 <p:sld xmlns:a="http://schemas.openxmlformats.org/drawingml/2006/main" xmlns:r="http://schemas.openxmlformats.org/officeDocument/2006/relationships" xmlns:p="http://schemas.openxmlformats.org/presentationml/2006/main">
   <p:cSld>
     <p:spTree>
@@ -6742,601 +7687,20 @@
   <p:clrMapOvr>
     <a:masterClrMapping/>
   </p:clrMapOvr>
-  <p:transition xmlns:p14="http://schemas.microsoft.com/office/powerpoint/2010/main" spd="slow">
+  <p:transition spd="slow">
     <p:cut/>
   </p:transition>
   <p:timing>
     <p:tnLst>
       <p:par>
-        <p:cTn xmlns:p14="http://schemas.microsoft.com/office/powerpoint/2010/main" id="1" dur="indefinite" restart="never" nodeType="tmRoot"/>
+        <p:cTn id="1" dur="indefinite" restart="never" nodeType="tmRoot"/>
       </p:par>
     </p:tnLst>
   </p:timing>
 </p:sld>
 </file>
 
-<file path=ppt/slides/slide20.xml><?xml version="1.0" encoding="utf-8"?>
-<p:sld xmlns:a="http://schemas.openxmlformats.org/drawingml/2006/main" xmlns:r="http://schemas.openxmlformats.org/officeDocument/2006/relationships" xmlns:p="http://schemas.openxmlformats.org/presentationml/2006/main">
-  <p:cSld>
-    <p:spTree>
-      <p:nvGrpSpPr>
-        <p:cNvPr id="1" name=""/>
-        <p:cNvGrpSpPr/>
-        <p:nvPr/>
-      </p:nvGrpSpPr>
-      <p:grpSpPr>
-        <a:xfrm>
-          <a:off x="0" y="0"/>
-          <a:ext cx="0" cy="0"/>
-          <a:chOff x="0" y="0"/>
-          <a:chExt cx="0" cy="0"/>
-        </a:xfrm>
-      </p:grpSpPr>
-      <p:sp>
-        <p:nvSpPr>
-          <p:cNvPr id="2" name="Title 1"/>
-          <p:cNvSpPr>
-            <a:spLocks noGrp="1"/>
-          </p:cNvSpPr>
-          <p:nvPr>
-            <p:ph type="title"/>
-          </p:nvPr>
-        </p:nvSpPr>
-        <p:spPr/>
-        <p:txBody>
-          <a:bodyPr/>
-          <a:lstStyle/>
-          <a:p>
-            <a:r>
-              <a:rPr lang="en-US" dirty="0" smtClean="0"/>
-              <a:t>How Kraken Works (2)</a:t>
-            </a:r>
-            <a:endParaRPr lang="en-US" dirty="0"/>
-          </a:p>
-        </p:txBody>
-      </p:sp>
-      <p:sp>
-        <p:nvSpPr>
-          <p:cNvPr id="3" name="Content Placeholder 2"/>
-          <p:cNvSpPr>
-            <a:spLocks noGrp="1"/>
-          </p:cNvSpPr>
-          <p:nvPr>
-            <p:ph idx="1"/>
-          </p:nvPr>
-        </p:nvSpPr>
-        <p:spPr/>
-        <p:txBody>
-          <a:bodyPr/>
-          <a:lstStyle/>
-          <a:p>
-            <a:r>
-              <a:rPr lang="en-US" dirty="0" smtClean="0"/>
-              <a:t>For each read of a query, decompose into k-</a:t>
-            </a:r>
-            <a:r>
-              <a:rPr lang="en-US" dirty="0" err="1" smtClean="0"/>
-              <a:t>mers</a:t>
-            </a:r>
-            <a:endParaRPr lang="en-US" dirty="0" smtClean="0"/>
-          </a:p>
-          <a:p>
-            <a:r>
-              <a:rPr lang="en-US" dirty="0" smtClean="0"/>
-              <a:t>Find LCA of each k-</a:t>
-            </a:r>
-            <a:r>
-              <a:rPr lang="en-US" dirty="0" err="1" smtClean="0"/>
-              <a:t>mer</a:t>
-            </a:r>
-            <a:r>
-              <a:rPr lang="en-US" dirty="0" smtClean="0"/>
-              <a:t> form database</a:t>
-            </a:r>
-          </a:p>
-          <a:p>
-            <a:r>
-              <a:rPr lang="en-US" dirty="0" smtClean="0"/>
-              <a:t>Score most probable assignment of each read based on all the k-</a:t>
-            </a:r>
-            <a:r>
-              <a:rPr lang="en-US" dirty="0" err="1" smtClean="0"/>
-              <a:t>mers</a:t>
-            </a:r>
-            <a:endParaRPr lang="en-US" dirty="0"/>
-          </a:p>
-        </p:txBody>
-      </p:sp>
-    </p:spTree>
-    <p:extLst>
-      <p:ext uri="{BB962C8B-B14F-4D97-AF65-F5344CB8AC3E}">
-        <p14:creationId xmlns:p14="http://schemas.microsoft.com/office/powerpoint/2010/main" val="466722915"/>
-      </p:ext>
-    </p:extLst>
-  </p:cSld>
-  <p:clrMapOvr>
-    <a:masterClrMapping/>
-  </p:clrMapOvr>
-  <p:timing>
-    <p:tnLst>
-      <p:par>
-        <p:cTn xmlns:p14="http://schemas.microsoft.com/office/powerpoint/2010/main" id="1" dur="indefinite" restart="never" nodeType="tmRoot"/>
-      </p:par>
-    </p:tnLst>
-  </p:timing>
-</p:sld>
-</file>
-
-<file path=ppt/slides/slide21.xml><?xml version="1.0" encoding="utf-8"?>
-<p:sld xmlns:a="http://schemas.openxmlformats.org/drawingml/2006/main" xmlns:r="http://schemas.openxmlformats.org/officeDocument/2006/relationships" xmlns:p="http://schemas.openxmlformats.org/presentationml/2006/main">
-  <p:cSld>
-    <p:spTree>
-      <p:nvGrpSpPr>
-        <p:cNvPr id="1" name="Shape 393"/>
-        <p:cNvGrpSpPr/>
-        <p:nvPr/>
-      </p:nvGrpSpPr>
-      <p:grpSpPr>
-        <a:xfrm>
-          <a:off x="0" y="0"/>
-          <a:ext cx="0" cy="0"/>
-          <a:chOff x="0" y="0"/>
-          <a:chExt cx="0" cy="0"/>
-        </a:xfrm>
-      </p:grpSpPr>
-      <p:sp>
-        <p:nvSpPr>
-          <p:cNvPr id="394" name="Shape 394"/>
-          <p:cNvSpPr txBox="1">
-            <a:spLocks noGrp="1"/>
-          </p:cNvSpPr>
-          <p:nvPr>
-            <p:ph type="title"/>
-          </p:nvPr>
-        </p:nvSpPr>
-        <p:spPr>
-          <a:prstGeom prst="rect">
-            <a:avLst/>
-          </a:prstGeom>
-          <a:noFill/>
-          <a:ln>
-            <a:noFill/>
-          </a:ln>
-        </p:spPr>
-        <p:txBody>
-          <a:bodyPr lIns="91425" tIns="45700" rIns="91425" bIns="45700" anchor="ctr" anchorCtr="0">
-            <a:noAutofit/>
-          </a:bodyPr>
-          <a:lstStyle/>
-          <a:p>
-            <a:pPr marL="0" marR="0" lvl="0" indent="0" algn="ctr" rtl="0">
-              <a:spcBef>
-                <a:spcPts val="0"/>
-              </a:spcBef>
-              <a:buClr>
-                <a:schemeClr val="dk1"/>
-              </a:buClr>
-              <a:buSzPct val="25000"/>
-              <a:buFont typeface="Calibri"/>
-              <a:buNone/>
-            </a:pPr>
-            <a:r>
-              <a:rPr lang="en-US" sz="4400" b="0" i="0" u="none" strike="noStrike" cap="none" dirty="0">
-                <a:solidFill>
-                  <a:schemeClr val="dk1"/>
-                </a:solidFill>
-                <a:latin typeface="Calibri"/>
-                <a:ea typeface="Calibri"/>
-                <a:cs typeface="Calibri"/>
-                <a:sym typeface="Calibri"/>
-              </a:rPr>
-              <a:t>Kraken </a:t>
-            </a:r>
-            <a:r>
-              <a:rPr lang="en-US" sz="4400" b="0" i="0" u="none" strike="noStrike" cap="none" dirty="0" smtClean="0">
-                <a:solidFill>
-                  <a:schemeClr val="dk1"/>
-                </a:solidFill>
-                <a:latin typeface="Calibri"/>
-                <a:ea typeface="Calibri"/>
-                <a:cs typeface="Calibri"/>
-                <a:sym typeface="Calibri"/>
-              </a:rPr>
-              <a:t>scoring</a:t>
-            </a:r>
-            <a:endParaRPr lang="en-US" sz="4400" b="0" i="0" u="none" strike="noStrike" cap="none" dirty="0">
-              <a:solidFill>
-                <a:schemeClr val="dk1"/>
-              </a:solidFill>
-              <a:latin typeface="Calibri"/>
-              <a:ea typeface="Calibri"/>
-              <a:cs typeface="Calibri"/>
-              <a:sym typeface="Calibri"/>
-            </a:endParaRPr>
-          </a:p>
-        </p:txBody>
-      </p:sp>
-      <p:pic>
-        <p:nvPicPr>
-          <p:cNvPr id="395" name="Shape 395"/>
-          <p:cNvPicPr preferRelativeResize="0">
-            <a:picLocks noGrp="1"/>
-          </p:cNvPicPr>
-          <p:nvPr>
-            <p:ph idx="1"/>
-          </p:nvPr>
-        </p:nvPicPr>
-        <p:blipFill rotWithShape="1">
-          <a:blip r:embed="rId3">
-            <a:alphaModFix/>
-          </a:blip>
-          <a:srcRect l="-24611" r="-24611"/>
-          <a:stretch/>
-        </p:blipFill>
-        <p:spPr>
-          <a:xfrm>
-            <a:off x="457200" y="1200151"/>
-            <a:ext cx="8229600" cy="3394472"/>
-          </a:xfrm>
-          <a:prstGeom prst="rect">
-            <a:avLst/>
-          </a:prstGeom>
-          <a:noFill/>
-          <a:ln>
-            <a:noFill/>
-          </a:ln>
-        </p:spPr>
-      </p:pic>
-      <p:sp>
-        <p:nvSpPr>
-          <p:cNvPr id="2" name="Oval Callout 1"/>
-          <p:cNvSpPr/>
-          <p:nvPr/>
-        </p:nvSpPr>
-        <p:spPr>
-          <a:xfrm>
-            <a:off x="274589" y="669283"/>
-            <a:ext cx="1878426" cy="1317782"/>
-          </a:xfrm>
-          <a:prstGeom prst="wedgeEllipseCallout">
-            <a:avLst>
-              <a:gd name="adj1" fmla="val 89073"/>
-              <a:gd name="adj2" fmla="val 101421"/>
-            </a:avLst>
-          </a:prstGeom>
-        </p:spPr>
-        <p:style>
-          <a:lnRef idx="1">
-            <a:schemeClr val="accent1"/>
-          </a:lnRef>
-          <a:fillRef idx="3">
-            <a:schemeClr val="accent1"/>
-          </a:fillRef>
-          <a:effectRef idx="2">
-            <a:schemeClr val="accent1"/>
-          </a:effectRef>
-          <a:fontRef idx="minor">
-            <a:schemeClr val="lt1"/>
-          </a:fontRef>
-        </p:style>
-        <p:txBody>
-          <a:bodyPr rtlCol="0" anchor="ctr"/>
-          <a:lstStyle/>
-          <a:p>
-            <a:pPr algn="ctr"/>
-            <a:r>
-              <a:rPr lang="en-US" dirty="0" smtClean="0"/>
-              <a:t>1. Map K-</a:t>
-            </a:r>
-            <a:r>
-              <a:rPr lang="en-US" dirty="0" err="1" smtClean="0"/>
-              <a:t>mers</a:t>
-            </a:r>
-            <a:r>
-              <a:rPr lang="en-US" dirty="0" smtClean="0"/>
-              <a:t> in database to taxon tree</a:t>
-            </a:r>
-            <a:endParaRPr lang="en-US" dirty="0"/>
-          </a:p>
-        </p:txBody>
-      </p:sp>
-    </p:spTree>
-    <p:extLst>
-      <p:ext uri="{BB962C8B-B14F-4D97-AF65-F5344CB8AC3E}">
-        <p14:creationId xmlns:p14="http://schemas.microsoft.com/office/powerpoint/2010/main" val="3443749673"/>
-      </p:ext>
-    </p:extLst>
-  </p:cSld>
-  <p:clrMapOvr>
-    <a:masterClrMapping/>
-  </p:clrMapOvr>
-  <p:transition xmlns:p14="http://schemas.microsoft.com/office/powerpoint/2010/main" spd="slow">
-    <p:cut/>
-  </p:transition>
-  <p:timing>
-    <p:tnLst>
-      <p:par>
-        <p:cTn xmlns:p14="http://schemas.microsoft.com/office/powerpoint/2010/main" id="1" dur="indefinite" restart="never" nodeType="tmRoot"/>
-      </p:par>
-    </p:tnLst>
-  </p:timing>
-</p:sld>
-</file>
-
-<file path=ppt/slides/slide22.xml><?xml version="1.0" encoding="utf-8"?>
-<p:sld xmlns:a="http://schemas.openxmlformats.org/drawingml/2006/main" xmlns:r="http://schemas.openxmlformats.org/officeDocument/2006/relationships" xmlns:p="http://schemas.openxmlformats.org/presentationml/2006/main">
-  <p:cSld>
-    <p:spTree>
-      <p:nvGrpSpPr>
-        <p:cNvPr id="1" name="Shape 393"/>
-        <p:cNvGrpSpPr/>
-        <p:nvPr/>
-      </p:nvGrpSpPr>
-      <p:grpSpPr>
-        <a:xfrm>
-          <a:off x="0" y="0"/>
-          <a:ext cx="0" cy="0"/>
-          <a:chOff x="0" y="0"/>
-          <a:chExt cx="0" cy="0"/>
-        </a:xfrm>
-      </p:grpSpPr>
-      <p:sp>
-        <p:nvSpPr>
-          <p:cNvPr id="394" name="Shape 394"/>
-          <p:cNvSpPr txBox="1">
-            <a:spLocks noGrp="1"/>
-          </p:cNvSpPr>
-          <p:nvPr>
-            <p:ph type="title"/>
-          </p:nvPr>
-        </p:nvSpPr>
-        <p:spPr>
-          <a:prstGeom prst="rect">
-            <a:avLst/>
-          </a:prstGeom>
-          <a:noFill/>
-          <a:ln>
-            <a:noFill/>
-          </a:ln>
-        </p:spPr>
-        <p:txBody>
-          <a:bodyPr lIns="91425" tIns="45700" rIns="91425" bIns="45700" anchor="ctr" anchorCtr="0">
-            <a:noAutofit/>
-          </a:bodyPr>
-          <a:lstStyle/>
-          <a:p>
-            <a:pPr marL="0" marR="0" lvl="0" indent="0" algn="ctr" rtl="0">
-              <a:spcBef>
-                <a:spcPts val="0"/>
-              </a:spcBef>
-              <a:buClr>
-                <a:schemeClr val="dk1"/>
-              </a:buClr>
-              <a:buSzPct val="25000"/>
-              <a:buFont typeface="Calibri"/>
-              <a:buNone/>
-            </a:pPr>
-            <a:r>
-              <a:rPr lang="en-US" sz="4400" b="0" i="0" u="none" strike="noStrike" cap="none" dirty="0">
-                <a:solidFill>
-                  <a:schemeClr val="dk1"/>
-                </a:solidFill>
-                <a:latin typeface="Calibri"/>
-                <a:ea typeface="Calibri"/>
-                <a:cs typeface="Calibri"/>
-                <a:sym typeface="Calibri"/>
-              </a:rPr>
-              <a:t>Kraken </a:t>
-            </a:r>
-            <a:r>
-              <a:rPr lang="en-US" sz="4400" b="0" i="0" u="none" strike="noStrike" cap="none" dirty="0" smtClean="0">
-                <a:solidFill>
-                  <a:schemeClr val="dk1"/>
-                </a:solidFill>
-                <a:latin typeface="Calibri"/>
-                <a:ea typeface="Calibri"/>
-                <a:cs typeface="Calibri"/>
-                <a:sym typeface="Calibri"/>
-              </a:rPr>
-              <a:t>scoring</a:t>
-            </a:r>
-            <a:endParaRPr lang="en-US" sz="4400" b="0" i="0" u="none" strike="noStrike" cap="none" dirty="0">
-              <a:solidFill>
-                <a:schemeClr val="dk1"/>
-              </a:solidFill>
-              <a:latin typeface="Calibri"/>
-              <a:ea typeface="Calibri"/>
-              <a:cs typeface="Calibri"/>
-              <a:sym typeface="Calibri"/>
-            </a:endParaRPr>
-          </a:p>
-        </p:txBody>
-      </p:sp>
-      <p:pic>
-        <p:nvPicPr>
-          <p:cNvPr id="395" name="Shape 395"/>
-          <p:cNvPicPr preferRelativeResize="0">
-            <a:picLocks noGrp="1"/>
-          </p:cNvPicPr>
-          <p:nvPr>
-            <p:ph idx="1"/>
-          </p:nvPr>
-        </p:nvPicPr>
-        <p:blipFill rotWithShape="1">
-          <a:blip r:embed="rId3">
-            <a:alphaModFix/>
-          </a:blip>
-          <a:srcRect l="-24611" r="-24611"/>
-          <a:stretch/>
-        </p:blipFill>
-        <p:spPr>
-          <a:xfrm>
-            <a:off x="457200" y="1200151"/>
-            <a:ext cx="8229600" cy="3394472"/>
-          </a:xfrm>
-          <a:prstGeom prst="rect">
-            <a:avLst/>
-          </a:prstGeom>
-          <a:noFill/>
-          <a:ln>
-            <a:noFill/>
-          </a:ln>
-        </p:spPr>
-      </p:pic>
-      <p:sp>
-        <p:nvSpPr>
-          <p:cNvPr id="4" name="Oval Callout 3"/>
-          <p:cNvSpPr/>
-          <p:nvPr/>
-        </p:nvSpPr>
-        <p:spPr>
-          <a:xfrm>
-            <a:off x="6101007" y="379690"/>
-            <a:ext cx="2334434" cy="1607375"/>
-          </a:xfrm>
-          <a:prstGeom prst="wedgeEllipseCallout">
-            <a:avLst>
-              <a:gd name="adj1" fmla="val -56839"/>
-              <a:gd name="adj2" fmla="val 69674"/>
-            </a:avLst>
-          </a:prstGeom>
-        </p:spPr>
-        <p:style>
-          <a:lnRef idx="1">
-            <a:schemeClr val="accent1"/>
-          </a:lnRef>
-          <a:fillRef idx="3">
-            <a:schemeClr val="accent1"/>
-          </a:fillRef>
-          <a:effectRef idx="2">
-            <a:schemeClr val="accent1"/>
-          </a:effectRef>
-          <a:fontRef idx="minor">
-            <a:schemeClr val="lt1"/>
-          </a:fontRef>
-        </p:style>
-        <p:txBody>
-          <a:bodyPr rtlCol="0" anchor="ctr"/>
-          <a:lstStyle/>
-          <a:p>
-            <a:pPr algn="ctr"/>
-            <a:r>
-              <a:rPr lang="en-US" dirty="0" smtClean="0"/>
-              <a:t>Assign to a taxon based on weighted scoring method</a:t>
-            </a:r>
-            <a:endParaRPr lang="en-US" dirty="0"/>
-          </a:p>
-        </p:txBody>
-      </p:sp>
-    </p:spTree>
-    <p:extLst>
-      <p:ext uri="{BB962C8B-B14F-4D97-AF65-F5344CB8AC3E}">
-        <p14:creationId xmlns:p14="http://schemas.microsoft.com/office/powerpoint/2010/main" val="323564138"/>
-      </p:ext>
-    </p:extLst>
-  </p:cSld>
-  <p:clrMapOvr>
-    <a:masterClrMapping/>
-  </p:clrMapOvr>
-  <p:transition xmlns:p14="http://schemas.microsoft.com/office/powerpoint/2010/main" spd="slow">
-    <p:cut/>
-  </p:transition>
-  <p:timing>
-    <p:tnLst>
-      <p:par>
-        <p:cTn xmlns:p14="http://schemas.microsoft.com/office/powerpoint/2010/main" id="1" dur="indefinite" restart="never" nodeType="tmRoot"/>
-      </p:par>
-    </p:tnLst>
-  </p:timing>
-</p:sld>
-</file>
-
-<file path=ppt/slides/slide23.xml><?xml version="1.0" encoding="utf-8"?>
-<p:sld xmlns:a="http://schemas.openxmlformats.org/drawingml/2006/main" xmlns:r="http://schemas.openxmlformats.org/officeDocument/2006/relationships" xmlns:p="http://schemas.openxmlformats.org/presentationml/2006/main">
-  <p:cSld>
-    <p:spTree>
-      <p:nvGrpSpPr>
-        <p:cNvPr id="1" name=""/>
-        <p:cNvGrpSpPr/>
-        <p:nvPr/>
-      </p:nvGrpSpPr>
-      <p:grpSpPr>
-        <a:xfrm>
-          <a:off x="0" y="0"/>
-          <a:ext cx="0" cy="0"/>
-          <a:chOff x="0" y="0"/>
-          <a:chExt cx="0" cy="0"/>
-        </a:xfrm>
-      </p:grpSpPr>
-      <p:sp>
-        <p:nvSpPr>
-          <p:cNvPr id="2" name="Title 1"/>
-          <p:cNvSpPr>
-            <a:spLocks noGrp="1"/>
-          </p:cNvSpPr>
-          <p:nvPr>
-            <p:ph type="title"/>
-          </p:nvPr>
-        </p:nvSpPr>
-        <p:spPr/>
-        <p:txBody>
-          <a:bodyPr/>
-          <a:lstStyle/>
-          <a:p>
-            <a:r>
-              <a:rPr lang="en-US" dirty="0" smtClean="0"/>
-              <a:t>Test results</a:t>
-            </a:r>
-            <a:endParaRPr lang="en-US" dirty="0"/>
-          </a:p>
-        </p:txBody>
-      </p:sp>
-      <p:pic>
-        <p:nvPicPr>
-          <p:cNvPr id="4" name="Content Placeholder 3" descr="Screenshot 2016-03-15 12.52.34.png"/>
-          <p:cNvPicPr>
-            <a:picLocks noGrp="1" noChangeAspect="1"/>
-          </p:cNvPicPr>
-          <p:nvPr>
-            <p:ph idx="1"/>
-          </p:nvPr>
-        </p:nvPicPr>
-        <p:blipFill>
-          <a:blip r:embed="rId2">
-            <a:extLst>
-              <a:ext uri="{28A0092B-C50C-407E-A947-70E740481C1C}">
-                <a14:useLocalDpi xmlns:a14="http://schemas.microsoft.com/office/drawing/2010/main" val="0"/>
-              </a:ext>
-            </a:extLst>
-          </a:blip>
-          <a:srcRect l="-8823" r="-8823"/>
-          <a:stretch>
-            <a:fillRect/>
-          </a:stretch>
-        </p:blipFill>
-        <p:spPr/>
-      </p:pic>
-    </p:spTree>
-    <p:extLst>
-      <p:ext uri="{BB962C8B-B14F-4D97-AF65-F5344CB8AC3E}">
-        <p14:creationId xmlns:p14="http://schemas.microsoft.com/office/powerpoint/2010/main" val="3918438209"/>
-      </p:ext>
-    </p:extLst>
-  </p:cSld>
-  <p:clrMapOvr>
-    <a:masterClrMapping/>
-  </p:clrMapOvr>
-  <p:timing>
-    <p:tnLst>
-      <p:par>
-        <p:cTn xmlns:p14="http://schemas.microsoft.com/office/powerpoint/2010/main" id="1" dur="indefinite" restart="never" nodeType="tmRoot"/>
-      </p:par>
-    </p:tnLst>
-  </p:timing>
-</p:sld>
-</file>
-
-<file path=ppt/slides/slide3.xml><?xml version="1.0" encoding="utf-8"?>
+<file path=ppt/slides/slide4.xml><?xml version="1.0" encoding="utf-8"?>
 <p:sld xmlns:a="http://schemas.openxmlformats.org/drawingml/2006/main" xmlns:r="http://schemas.openxmlformats.org/officeDocument/2006/relationships" xmlns:p="http://schemas.openxmlformats.org/presentationml/2006/main">
   <p:cSld>
     <p:spTree>
@@ -7474,20 +7838,20 @@
   <p:clrMapOvr>
     <a:masterClrMapping/>
   </p:clrMapOvr>
-  <p:transition xmlns:p14="http://schemas.microsoft.com/office/powerpoint/2010/main" spd="slow">
+  <p:transition spd="slow">
     <p:cut/>
   </p:transition>
   <p:timing>
     <p:tnLst>
       <p:par>
-        <p:cTn xmlns:p14="http://schemas.microsoft.com/office/powerpoint/2010/main" id="1" dur="indefinite" restart="never" nodeType="tmRoot"/>
+        <p:cTn id="1" dur="indefinite" restart="never" nodeType="tmRoot"/>
       </p:par>
     </p:tnLst>
   </p:timing>
 </p:sld>
 </file>
 
-<file path=ppt/slides/slide4.xml><?xml version="1.0" encoding="utf-8"?>
+<file path=ppt/slides/slide5.xml><?xml version="1.0" encoding="utf-8"?>
 <p:sld xmlns:a="http://schemas.openxmlformats.org/drawingml/2006/main" xmlns:r="http://schemas.openxmlformats.org/officeDocument/2006/relationships" xmlns:p="http://schemas.openxmlformats.org/presentationml/2006/main">
   <p:cSld>
     <p:spTree>
@@ -7602,20 +7966,20 @@
   <p:clrMapOvr>
     <a:masterClrMapping/>
   </p:clrMapOvr>
-  <p:transition xmlns:p14="http://schemas.microsoft.com/office/powerpoint/2010/main" spd="slow">
+  <p:transition spd="slow">
     <p:cut/>
   </p:transition>
   <p:timing>
     <p:tnLst>
       <p:par>
-        <p:cTn xmlns:p14="http://schemas.microsoft.com/office/powerpoint/2010/main" id="1" dur="indefinite" restart="never" nodeType="tmRoot"/>
+        <p:cTn id="1" dur="indefinite" restart="never" nodeType="tmRoot"/>
       </p:par>
     </p:tnLst>
   </p:timing>
 </p:sld>
 </file>
 
-<file path=ppt/slides/slide5.xml><?xml version="1.0" encoding="utf-8"?>
+<file path=ppt/slides/slide6.xml><?xml version="1.0" encoding="utf-8"?>
 <p:sld xmlns:a="http://schemas.openxmlformats.org/drawingml/2006/main" xmlns:r="http://schemas.openxmlformats.org/officeDocument/2006/relationships" xmlns:p="http://schemas.openxmlformats.org/presentationml/2006/main">
   <p:cSld>
     <p:spTree>
@@ -7703,20 +8067,20 @@
   <p:clrMapOvr>
     <a:masterClrMapping/>
   </p:clrMapOvr>
-  <p:transition xmlns:p14="http://schemas.microsoft.com/office/powerpoint/2010/main" spd="slow">
+  <p:transition spd="slow">
     <p:cut/>
   </p:transition>
   <p:timing>
     <p:tnLst>
       <p:par>
-        <p:cTn xmlns:p14="http://schemas.microsoft.com/office/powerpoint/2010/main" id="1" dur="indefinite" restart="never" nodeType="tmRoot"/>
+        <p:cTn id="1" dur="indefinite" restart="never" nodeType="tmRoot"/>
       </p:par>
     </p:tnLst>
   </p:timing>
 </p:sld>
 </file>
 
-<file path=ppt/slides/slide6.xml><?xml version="1.0" encoding="utf-8"?>
+<file path=ppt/slides/slide7.xml><?xml version="1.0" encoding="utf-8"?>
 <p:sld xmlns:a="http://schemas.openxmlformats.org/drawingml/2006/main" xmlns:r="http://schemas.openxmlformats.org/officeDocument/2006/relationships" xmlns:p="http://schemas.openxmlformats.org/presentationml/2006/main">
   <p:cSld>
     <p:spTree>
@@ -7835,20 +8199,20 @@
   <p:clrMapOvr>
     <a:masterClrMapping/>
   </p:clrMapOvr>
-  <p:transition xmlns:p14="http://schemas.microsoft.com/office/powerpoint/2010/main" spd="slow">
+  <p:transition spd="slow">
     <p:cut/>
   </p:transition>
   <p:timing>
     <p:tnLst>
       <p:par>
-        <p:cTn xmlns:p14="http://schemas.microsoft.com/office/powerpoint/2010/main" id="1" dur="indefinite" restart="never" nodeType="tmRoot"/>
+        <p:cTn id="1" dur="indefinite" restart="never" nodeType="tmRoot"/>
       </p:par>
     </p:tnLst>
   </p:timing>
 </p:sld>
 </file>
 
-<file path=ppt/slides/slide7.xml><?xml version="1.0" encoding="utf-8"?>
+<file path=ppt/slides/slide8.xml><?xml version="1.0" encoding="utf-8"?>
 <p:sld xmlns:a="http://schemas.openxmlformats.org/drawingml/2006/main" xmlns:r="http://schemas.openxmlformats.org/officeDocument/2006/relationships" xmlns:p="http://schemas.openxmlformats.org/presentationml/2006/main">
   <p:cSld>
     <p:spTree>
@@ -7932,20 +8296,20 @@
   <p:clrMapOvr>
     <a:masterClrMapping/>
   </p:clrMapOvr>
-  <p:transition xmlns:p14="http://schemas.microsoft.com/office/powerpoint/2010/main" spd="slow">
+  <p:transition spd="slow">
     <p:cut/>
   </p:transition>
   <p:timing>
     <p:tnLst>
       <p:par>
-        <p:cTn xmlns:p14="http://schemas.microsoft.com/office/powerpoint/2010/main" id="1" dur="indefinite" restart="never" nodeType="tmRoot"/>
+        <p:cTn id="1" dur="indefinite" restart="never" nodeType="tmRoot"/>
       </p:par>
     </p:tnLst>
   </p:timing>
 </p:sld>
 </file>
 
-<file path=ppt/slides/slide8.xml><?xml version="1.0" encoding="utf-8"?>
+<file path=ppt/slides/slide9.xml><?xml version="1.0" encoding="utf-8"?>
 <p:sld xmlns:a="http://schemas.openxmlformats.org/drawingml/2006/main" xmlns:r="http://schemas.openxmlformats.org/officeDocument/2006/relationships" xmlns:p="http://schemas.openxmlformats.org/presentationml/2006/main">
   <p:cSld>
     <p:spTree>
@@ -8047,161 +8411,13 @@
   <p:clrMapOvr>
     <a:masterClrMapping/>
   </p:clrMapOvr>
-  <p:transition xmlns:p14="http://schemas.microsoft.com/office/powerpoint/2010/main" spd="slow">
+  <p:transition spd="slow">
     <p:cut/>
   </p:transition>
   <p:timing>
     <p:tnLst>
       <p:par>
-        <p:cTn xmlns:p14="http://schemas.microsoft.com/office/powerpoint/2010/main" id="1" dur="indefinite" restart="never" nodeType="tmRoot"/>
-      </p:par>
-    </p:tnLst>
-  </p:timing>
-</p:sld>
-</file>
-
-<file path=ppt/slides/slide9.xml><?xml version="1.0" encoding="utf-8"?>
-<p:sld xmlns:a="http://schemas.openxmlformats.org/drawingml/2006/main" xmlns:r="http://schemas.openxmlformats.org/officeDocument/2006/relationships" xmlns:p="http://schemas.openxmlformats.org/presentationml/2006/main">
-  <p:cSld>
-    <p:spTree>
-      <p:nvGrpSpPr>
-        <p:cNvPr id="1" name="Shape 83"/>
-        <p:cNvGrpSpPr/>
-        <p:nvPr/>
-      </p:nvGrpSpPr>
-      <p:grpSpPr>
-        <a:xfrm>
-          <a:off x="0" y="0"/>
-          <a:ext cx="0" cy="0"/>
-          <a:chOff x="0" y="0"/>
-          <a:chExt cx="0" cy="0"/>
-        </a:xfrm>
-      </p:grpSpPr>
-      <p:sp>
-        <p:nvSpPr>
-          <p:cNvPr id="84" name="Shape 84"/>
-          <p:cNvSpPr txBox="1">
-            <a:spLocks noGrp="1"/>
-          </p:cNvSpPr>
-          <p:nvPr>
-            <p:ph type="title"/>
-          </p:nvPr>
-        </p:nvSpPr>
-        <p:spPr>
-          <a:prstGeom prst="rect">
-            <a:avLst/>
-          </a:prstGeom>
-        </p:spPr>
-        <p:txBody>
-          <a:bodyPr lIns="91425" tIns="91425" rIns="91425" bIns="91425" anchor="b" anchorCtr="0">
-            <a:noAutofit/>
-          </a:bodyPr>
-          <a:lstStyle/>
-          <a:p>
-            <a:pPr lvl="0">
-              <a:spcBef>
-                <a:spcPts val="0"/>
-              </a:spcBef>
-              <a:buNone/>
-            </a:pPr>
-            <a:r>
-              <a:rPr lang="en"/>
-              <a:t>This practical</a:t>
-            </a:r>
-          </a:p>
-        </p:txBody>
-      </p:sp>
-      <p:sp>
-        <p:nvSpPr>
-          <p:cNvPr id="85" name="Shape 85"/>
-          <p:cNvSpPr txBox="1">
-            <a:spLocks noGrp="1"/>
-          </p:cNvSpPr>
-          <p:nvPr>
-            <p:ph type="body" idx="1"/>
-          </p:nvPr>
-        </p:nvSpPr>
-        <p:spPr>
-          <a:prstGeom prst="rect">
-            <a:avLst/>
-          </a:prstGeom>
-        </p:spPr>
-        <p:txBody>
-          <a:bodyPr lIns="91425" tIns="91425" rIns="91425" bIns="91425" anchor="t" anchorCtr="0">
-            <a:noAutofit/>
-          </a:bodyPr>
-          <a:lstStyle/>
-          <a:p>
-            <a:pPr lvl="0" rtl="0">
-              <a:spcBef>
-                <a:spcPts val="0"/>
-              </a:spcBef>
-              <a:buNone/>
-            </a:pPr>
-            <a:r>
-              <a:rPr lang="en"/>
-              <a:t>Aims:</a:t>
-            </a:r>
-          </a:p>
-          <a:p>
-            <a:pPr lvl="0" rtl="0">
-              <a:spcBef>
-                <a:spcPts val="0"/>
-              </a:spcBef>
-              <a:buNone/>
-            </a:pPr>
-            <a:r>
-              <a:rPr lang="en"/>
-              <a:t>	Get used to handling real data sets</a:t>
-            </a:r>
-          </a:p>
-          <a:p>
-            <a:pPr lvl="0" indent="457200" rtl="0">
-              <a:spcBef>
-                <a:spcPts val="0"/>
-              </a:spcBef>
-              <a:buNone/>
-            </a:pPr>
-            <a:r>
-              <a:rPr lang="en"/>
-              <a:t>Compare results from different pipelines</a:t>
-            </a:r>
-          </a:p>
-          <a:p>
-            <a:pPr lvl="0" indent="457200" rtl="0">
-              <a:spcBef>
-                <a:spcPts val="0"/>
-              </a:spcBef>
-              <a:buNone/>
-            </a:pPr>
-            <a:r>
-              <a:rPr lang="en"/>
-              <a:t>Munge Excel</a:t>
-            </a:r>
-          </a:p>
-          <a:p>
-            <a:pPr lvl="0" indent="457200">
-              <a:spcBef>
-                <a:spcPts val="0"/>
-              </a:spcBef>
-              <a:buNone/>
-            </a:pPr>
-            <a:endParaRPr/>
-          </a:p>
-        </p:txBody>
-      </p:sp>
-    </p:spTree>
-  </p:cSld>
-  <p:clrMapOvr>
-    <a:masterClrMapping/>
-  </p:clrMapOvr>
-  <p:transition xmlns:p14="http://schemas.microsoft.com/office/powerpoint/2010/main" spd="slow">
-    <p:cut/>
-  </p:transition>
-  <p:timing>
-    <p:tnLst>
-      <p:par>
-        <p:cTn xmlns:p14="http://schemas.microsoft.com/office/powerpoint/2010/main" id="1" dur="indefinite" restart="never" nodeType="tmRoot"/>
+        <p:cTn id="1" dur="indefinite" restart="never" nodeType="tmRoot"/>
       </p:par>
     </p:tnLst>
   </p:timing>

</xml_diff>